<commit_message>
Gros changements la partie BD + Crypto
Gros changements sur le code d'initialisation, sur la BD, integration
code de FATI, Mise à jour du PPT (et version pdf), nettoyage
</commit_message>
<xml_diff>
--- a/Initialisation/BD.pptx
+++ b/Initialisation/BD.pptx
@@ -5,7 +5,7 @@
     <p:sldMasterId id="2147483648" r:id="rId1"/>
   </p:sldMasterIdLst>
   <p:sldIdLst>
-    <p:sldId id="256" r:id="rId2"/>
+    <p:sldId id="265" r:id="rId2"/>
   </p:sldIdLst>
   <p:sldSz cx="9144000" cy="6858000" type="screen4x3"/>
   <p:notesSz cx="6858000" cy="9144000"/>
@@ -286,11 +286,11 @@
           <a:bodyPr/>
           <a:lstStyle/>
           <a:p>
-            <a:fld id="{3DCBB16B-DC68-2E4C-AFD5-337D9207E47D}" type="datetimeFigureOut">
-              <a:rPr lang="fr-FR" smtClean="0"/>
-              <a:t>15/12/15</a:t>
+            <a:fld id="{8D32ADDA-B0AB-E047-8C8C-601BF4DFD54D}" type="datetimeFigureOut">
+              <a:rPr lang="fr-FR" smtClean="0"/>
+              <a:t>01/01/16</a:t>
             </a:fld>
-            <a:endParaRPr lang="fr-FR"/>
+            <a:endParaRPr lang="fr-FR" dirty="0"/>
           </a:p>
         </p:txBody>
       </p:sp>
@@ -309,7 +309,7 @@
           <a:bodyPr/>
           <a:lstStyle/>
           <a:p>
-            <a:endParaRPr lang="fr-FR"/>
+            <a:endParaRPr lang="fr-FR" dirty="0"/>
           </a:p>
         </p:txBody>
       </p:sp>
@@ -328,18 +328,18 @@
           <a:bodyPr/>
           <a:lstStyle/>
           <a:p>
-            <a:fld id="{EB3E5FD4-1617-FB43-AE66-91BF1C30F7D6}" type="slidenum">
+            <a:fld id="{A0AE0A3C-4983-E44E-B5FC-60BEE959FC11}" type="slidenum">
               <a:rPr lang="fr-FR" smtClean="0"/>
               <a:t>‹#›</a:t>
             </a:fld>
-            <a:endParaRPr lang="fr-FR"/>
+            <a:endParaRPr lang="fr-FR" dirty="0"/>
           </a:p>
         </p:txBody>
       </p:sp>
     </p:spTree>
     <p:extLst>
       <p:ext uri="{BB962C8B-B14F-4D97-AF65-F5344CB8AC3E}">
-        <p14:creationId xmlns:p14="http://schemas.microsoft.com/office/powerpoint/2010/main" val="789730610"/>
+        <p14:creationId xmlns:p14="http://schemas.microsoft.com/office/powerpoint/2010/main" val="4245437779"/>
       </p:ext>
     </p:extLst>
   </p:cSld>
@@ -456,11 +456,11 @@
           <a:bodyPr/>
           <a:lstStyle/>
           <a:p>
-            <a:fld id="{3DCBB16B-DC68-2E4C-AFD5-337D9207E47D}" type="datetimeFigureOut">
-              <a:rPr lang="fr-FR" smtClean="0"/>
-              <a:t>15/12/15</a:t>
+            <a:fld id="{8D32ADDA-B0AB-E047-8C8C-601BF4DFD54D}" type="datetimeFigureOut">
+              <a:rPr lang="fr-FR" smtClean="0"/>
+              <a:t>01/01/16</a:t>
             </a:fld>
-            <a:endParaRPr lang="fr-FR"/>
+            <a:endParaRPr lang="fr-FR" dirty="0"/>
           </a:p>
         </p:txBody>
       </p:sp>
@@ -479,7 +479,7 @@
           <a:bodyPr/>
           <a:lstStyle/>
           <a:p>
-            <a:endParaRPr lang="fr-FR"/>
+            <a:endParaRPr lang="fr-FR" dirty="0"/>
           </a:p>
         </p:txBody>
       </p:sp>
@@ -498,18 +498,18 @@
           <a:bodyPr/>
           <a:lstStyle/>
           <a:p>
-            <a:fld id="{EB3E5FD4-1617-FB43-AE66-91BF1C30F7D6}" type="slidenum">
+            <a:fld id="{A0AE0A3C-4983-E44E-B5FC-60BEE959FC11}" type="slidenum">
               <a:rPr lang="fr-FR" smtClean="0"/>
               <a:t>‹#›</a:t>
             </a:fld>
-            <a:endParaRPr lang="fr-FR"/>
+            <a:endParaRPr lang="fr-FR" dirty="0"/>
           </a:p>
         </p:txBody>
       </p:sp>
     </p:spTree>
     <p:extLst>
       <p:ext uri="{BB962C8B-B14F-4D97-AF65-F5344CB8AC3E}">
-        <p14:creationId xmlns:p14="http://schemas.microsoft.com/office/powerpoint/2010/main" val="1977265002"/>
+        <p14:creationId xmlns:p14="http://schemas.microsoft.com/office/powerpoint/2010/main" val="3373220097"/>
       </p:ext>
     </p:extLst>
   </p:cSld>
@@ -636,11 +636,11 @@
           <a:bodyPr/>
           <a:lstStyle/>
           <a:p>
-            <a:fld id="{3DCBB16B-DC68-2E4C-AFD5-337D9207E47D}" type="datetimeFigureOut">
-              <a:rPr lang="fr-FR" smtClean="0"/>
-              <a:t>15/12/15</a:t>
+            <a:fld id="{8D32ADDA-B0AB-E047-8C8C-601BF4DFD54D}" type="datetimeFigureOut">
+              <a:rPr lang="fr-FR" smtClean="0"/>
+              <a:t>01/01/16</a:t>
             </a:fld>
-            <a:endParaRPr lang="fr-FR"/>
+            <a:endParaRPr lang="fr-FR" dirty="0"/>
           </a:p>
         </p:txBody>
       </p:sp>
@@ -659,7 +659,7 @@
           <a:bodyPr/>
           <a:lstStyle/>
           <a:p>
-            <a:endParaRPr lang="fr-FR"/>
+            <a:endParaRPr lang="fr-FR" dirty="0"/>
           </a:p>
         </p:txBody>
       </p:sp>
@@ -678,18 +678,18 @@
           <a:bodyPr/>
           <a:lstStyle/>
           <a:p>
-            <a:fld id="{EB3E5FD4-1617-FB43-AE66-91BF1C30F7D6}" type="slidenum">
+            <a:fld id="{A0AE0A3C-4983-E44E-B5FC-60BEE959FC11}" type="slidenum">
               <a:rPr lang="fr-FR" smtClean="0"/>
               <a:t>‹#›</a:t>
             </a:fld>
-            <a:endParaRPr lang="fr-FR"/>
+            <a:endParaRPr lang="fr-FR" dirty="0"/>
           </a:p>
         </p:txBody>
       </p:sp>
     </p:spTree>
     <p:extLst>
       <p:ext uri="{BB962C8B-B14F-4D97-AF65-F5344CB8AC3E}">
-        <p14:creationId xmlns:p14="http://schemas.microsoft.com/office/powerpoint/2010/main" val="2289143388"/>
+        <p14:creationId xmlns:p14="http://schemas.microsoft.com/office/powerpoint/2010/main" val="540273469"/>
       </p:ext>
     </p:extLst>
   </p:cSld>
@@ -806,11 +806,11 @@
           <a:bodyPr/>
           <a:lstStyle/>
           <a:p>
-            <a:fld id="{3DCBB16B-DC68-2E4C-AFD5-337D9207E47D}" type="datetimeFigureOut">
-              <a:rPr lang="fr-FR" smtClean="0"/>
-              <a:t>15/12/15</a:t>
+            <a:fld id="{8D32ADDA-B0AB-E047-8C8C-601BF4DFD54D}" type="datetimeFigureOut">
+              <a:rPr lang="fr-FR" smtClean="0"/>
+              <a:t>01/01/16</a:t>
             </a:fld>
-            <a:endParaRPr lang="fr-FR"/>
+            <a:endParaRPr lang="fr-FR" dirty="0"/>
           </a:p>
         </p:txBody>
       </p:sp>
@@ -829,7 +829,7 @@
           <a:bodyPr/>
           <a:lstStyle/>
           <a:p>
-            <a:endParaRPr lang="fr-FR"/>
+            <a:endParaRPr lang="fr-FR" dirty="0"/>
           </a:p>
         </p:txBody>
       </p:sp>
@@ -848,18 +848,18 @@
           <a:bodyPr/>
           <a:lstStyle/>
           <a:p>
-            <a:fld id="{EB3E5FD4-1617-FB43-AE66-91BF1C30F7D6}" type="slidenum">
+            <a:fld id="{A0AE0A3C-4983-E44E-B5FC-60BEE959FC11}" type="slidenum">
               <a:rPr lang="fr-FR" smtClean="0"/>
               <a:t>‹#›</a:t>
             </a:fld>
-            <a:endParaRPr lang="fr-FR"/>
+            <a:endParaRPr lang="fr-FR" dirty="0"/>
           </a:p>
         </p:txBody>
       </p:sp>
     </p:spTree>
     <p:extLst>
       <p:ext uri="{BB962C8B-B14F-4D97-AF65-F5344CB8AC3E}">
-        <p14:creationId xmlns:p14="http://schemas.microsoft.com/office/powerpoint/2010/main" val="2010581346"/>
+        <p14:creationId xmlns:p14="http://schemas.microsoft.com/office/powerpoint/2010/main" val="1149729459"/>
       </p:ext>
     </p:extLst>
   </p:cSld>
@@ -1052,11 +1052,11 @@
           <a:bodyPr/>
           <a:lstStyle/>
           <a:p>
-            <a:fld id="{3DCBB16B-DC68-2E4C-AFD5-337D9207E47D}" type="datetimeFigureOut">
-              <a:rPr lang="fr-FR" smtClean="0"/>
-              <a:t>15/12/15</a:t>
+            <a:fld id="{8D32ADDA-B0AB-E047-8C8C-601BF4DFD54D}" type="datetimeFigureOut">
+              <a:rPr lang="fr-FR" smtClean="0"/>
+              <a:t>01/01/16</a:t>
             </a:fld>
-            <a:endParaRPr lang="fr-FR"/>
+            <a:endParaRPr lang="fr-FR" dirty="0"/>
           </a:p>
         </p:txBody>
       </p:sp>
@@ -1075,7 +1075,7 @@
           <a:bodyPr/>
           <a:lstStyle/>
           <a:p>
-            <a:endParaRPr lang="fr-FR"/>
+            <a:endParaRPr lang="fr-FR" dirty="0"/>
           </a:p>
         </p:txBody>
       </p:sp>
@@ -1094,18 +1094,18 @@
           <a:bodyPr/>
           <a:lstStyle/>
           <a:p>
-            <a:fld id="{EB3E5FD4-1617-FB43-AE66-91BF1C30F7D6}" type="slidenum">
+            <a:fld id="{A0AE0A3C-4983-E44E-B5FC-60BEE959FC11}" type="slidenum">
               <a:rPr lang="fr-FR" smtClean="0"/>
               <a:t>‹#›</a:t>
             </a:fld>
-            <a:endParaRPr lang="fr-FR"/>
+            <a:endParaRPr lang="fr-FR" dirty="0"/>
           </a:p>
         </p:txBody>
       </p:sp>
     </p:spTree>
     <p:extLst>
       <p:ext uri="{BB962C8B-B14F-4D97-AF65-F5344CB8AC3E}">
-        <p14:creationId xmlns:p14="http://schemas.microsoft.com/office/powerpoint/2010/main" val="942545589"/>
+        <p14:creationId xmlns:p14="http://schemas.microsoft.com/office/powerpoint/2010/main" val="676640401"/>
       </p:ext>
     </p:extLst>
   </p:cSld>
@@ -1340,11 +1340,11 @@
           <a:bodyPr/>
           <a:lstStyle/>
           <a:p>
-            <a:fld id="{3DCBB16B-DC68-2E4C-AFD5-337D9207E47D}" type="datetimeFigureOut">
-              <a:rPr lang="fr-FR" smtClean="0"/>
-              <a:t>15/12/15</a:t>
+            <a:fld id="{8D32ADDA-B0AB-E047-8C8C-601BF4DFD54D}" type="datetimeFigureOut">
+              <a:rPr lang="fr-FR" smtClean="0"/>
+              <a:t>01/01/16</a:t>
             </a:fld>
-            <a:endParaRPr lang="fr-FR"/>
+            <a:endParaRPr lang="fr-FR" dirty="0"/>
           </a:p>
         </p:txBody>
       </p:sp>
@@ -1363,7 +1363,7 @@
           <a:bodyPr/>
           <a:lstStyle/>
           <a:p>
-            <a:endParaRPr lang="fr-FR"/>
+            <a:endParaRPr lang="fr-FR" dirty="0"/>
           </a:p>
         </p:txBody>
       </p:sp>
@@ -1382,18 +1382,18 @@
           <a:bodyPr/>
           <a:lstStyle/>
           <a:p>
-            <a:fld id="{EB3E5FD4-1617-FB43-AE66-91BF1C30F7D6}" type="slidenum">
+            <a:fld id="{A0AE0A3C-4983-E44E-B5FC-60BEE959FC11}" type="slidenum">
               <a:rPr lang="fr-FR" smtClean="0"/>
               <a:t>‹#›</a:t>
             </a:fld>
-            <a:endParaRPr lang="fr-FR"/>
+            <a:endParaRPr lang="fr-FR" dirty="0"/>
           </a:p>
         </p:txBody>
       </p:sp>
     </p:spTree>
     <p:extLst>
       <p:ext uri="{BB962C8B-B14F-4D97-AF65-F5344CB8AC3E}">
-        <p14:creationId xmlns:p14="http://schemas.microsoft.com/office/powerpoint/2010/main" val="2765548804"/>
+        <p14:creationId xmlns:p14="http://schemas.microsoft.com/office/powerpoint/2010/main" val="2117304903"/>
       </p:ext>
     </p:extLst>
   </p:cSld>
@@ -1762,11 +1762,11 @@
           <a:bodyPr/>
           <a:lstStyle/>
           <a:p>
-            <a:fld id="{3DCBB16B-DC68-2E4C-AFD5-337D9207E47D}" type="datetimeFigureOut">
-              <a:rPr lang="fr-FR" smtClean="0"/>
-              <a:t>15/12/15</a:t>
+            <a:fld id="{8D32ADDA-B0AB-E047-8C8C-601BF4DFD54D}" type="datetimeFigureOut">
+              <a:rPr lang="fr-FR" smtClean="0"/>
+              <a:t>01/01/16</a:t>
             </a:fld>
-            <a:endParaRPr lang="fr-FR"/>
+            <a:endParaRPr lang="fr-FR" dirty="0"/>
           </a:p>
         </p:txBody>
       </p:sp>
@@ -1785,7 +1785,7 @@
           <a:bodyPr/>
           <a:lstStyle/>
           <a:p>
-            <a:endParaRPr lang="fr-FR"/>
+            <a:endParaRPr lang="fr-FR" dirty="0"/>
           </a:p>
         </p:txBody>
       </p:sp>
@@ -1804,18 +1804,18 @@
           <a:bodyPr/>
           <a:lstStyle/>
           <a:p>
-            <a:fld id="{EB3E5FD4-1617-FB43-AE66-91BF1C30F7D6}" type="slidenum">
+            <a:fld id="{A0AE0A3C-4983-E44E-B5FC-60BEE959FC11}" type="slidenum">
               <a:rPr lang="fr-FR" smtClean="0"/>
               <a:t>‹#›</a:t>
             </a:fld>
-            <a:endParaRPr lang="fr-FR"/>
+            <a:endParaRPr lang="fr-FR" dirty="0"/>
           </a:p>
         </p:txBody>
       </p:sp>
     </p:spTree>
     <p:extLst>
       <p:ext uri="{BB962C8B-B14F-4D97-AF65-F5344CB8AC3E}">
-        <p14:creationId xmlns:p14="http://schemas.microsoft.com/office/powerpoint/2010/main" val="756582348"/>
+        <p14:creationId xmlns:p14="http://schemas.microsoft.com/office/powerpoint/2010/main" val="2723175031"/>
       </p:ext>
     </p:extLst>
   </p:cSld>
@@ -1880,11 +1880,11 @@
           <a:bodyPr/>
           <a:lstStyle/>
           <a:p>
-            <a:fld id="{3DCBB16B-DC68-2E4C-AFD5-337D9207E47D}" type="datetimeFigureOut">
-              <a:rPr lang="fr-FR" smtClean="0"/>
-              <a:t>15/12/15</a:t>
+            <a:fld id="{8D32ADDA-B0AB-E047-8C8C-601BF4DFD54D}" type="datetimeFigureOut">
+              <a:rPr lang="fr-FR" smtClean="0"/>
+              <a:t>01/01/16</a:t>
             </a:fld>
-            <a:endParaRPr lang="fr-FR"/>
+            <a:endParaRPr lang="fr-FR" dirty="0"/>
           </a:p>
         </p:txBody>
       </p:sp>
@@ -1903,7 +1903,7 @@
           <a:bodyPr/>
           <a:lstStyle/>
           <a:p>
-            <a:endParaRPr lang="fr-FR"/>
+            <a:endParaRPr lang="fr-FR" dirty="0"/>
           </a:p>
         </p:txBody>
       </p:sp>
@@ -1922,18 +1922,18 @@
           <a:bodyPr/>
           <a:lstStyle/>
           <a:p>
-            <a:fld id="{EB3E5FD4-1617-FB43-AE66-91BF1C30F7D6}" type="slidenum">
+            <a:fld id="{A0AE0A3C-4983-E44E-B5FC-60BEE959FC11}" type="slidenum">
               <a:rPr lang="fr-FR" smtClean="0"/>
               <a:t>‹#›</a:t>
             </a:fld>
-            <a:endParaRPr lang="fr-FR"/>
+            <a:endParaRPr lang="fr-FR" dirty="0"/>
           </a:p>
         </p:txBody>
       </p:sp>
     </p:spTree>
     <p:extLst>
       <p:ext uri="{BB962C8B-B14F-4D97-AF65-F5344CB8AC3E}">
-        <p14:creationId xmlns:p14="http://schemas.microsoft.com/office/powerpoint/2010/main" val="2670881368"/>
+        <p14:creationId xmlns:p14="http://schemas.microsoft.com/office/powerpoint/2010/main" val="1857711480"/>
       </p:ext>
     </p:extLst>
   </p:cSld>
@@ -1975,11 +1975,11 @@
           <a:bodyPr/>
           <a:lstStyle/>
           <a:p>
-            <a:fld id="{3DCBB16B-DC68-2E4C-AFD5-337D9207E47D}" type="datetimeFigureOut">
-              <a:rPr lang="fr-FR" smtClean="0"/>
-              <a:t>15/12/15</a:t>
+            <a:fld id="{8D32ADDA-B0AB-E047-8C8C-601BF4DFD54D}" type="datetimeFigureOut">
+              <a:rPr lang="fr-FR" smtClean="0"/>
+              <a:t>01/01/16</a:t>
             </a:fld>
-            <a:endParaRPr lang="fr-FR"/>
+            <a:endParaRPr lang="fr-FR" dirty="0"/>
           </a:p>
         </p:txBody>
       </p:sp>
@@ -1998,7 +1998,7 @@
           <a:bodyPr/>
           <a:lstStyle/>
           <a:p>
-            <a:endParaRPr lang="fr-FR"/>
+            <a:endParaRPr lang="fr-FR" dirty="0"/>
           </a:p>
         </p:txBody>
       </p:sp>
@@ -2017,18 +2017,18 @@
           <a:bodyPr/>
           <a:lstStyle/>
           <a:p>
-            <a:fld id="{EB3E5FD4-1617-FB43-AE66-91BF1C30F7D6}" type="slidenum">
+            <a:fld id="{A0AE0A3C-4983-E44E-B5FC-60BEE959FC11}" type="slidenum">
               <a:rPr lang="fr-FR" smtClean="0"/>
               <a:t>‹#›</a:t>
             </a:fld>
-            <a:endParaRPr lang="fr-FR"/>
+            <a:endParaRPr lang="fr-FR" dirty="0"/>
           </a:p>
         </p:txBody>
       </p:sp>
     </p:spTree>
     <p:extLst>
       <p:ext uri="{BB962C8B-B14F-4D97-AF65-F5344CB8AC3E}">
-        <p14:creationId xmlns:p14="http://schemas.microsoft.com/office/powerpoint/2010/main" val="3328247342"/>
+        <p14:creationId xmlns:p14="http://schemas.microsoft.com/office/powerpoint/2010/main" val="3946226598"/>
       </p:ext>
     </p:extLst>
   </p:cSld>
@@ -2252,11 +2252,11 @@
           <a:bodyPr/>
           <a:lstStyle/>
           <a:p>
-            <a:fld id="{3DCBB16B-DC68-2E4C-AFD5-337D9207E47D}" type="datetimeFigureOut">
-              <a:rPr lang="fr-FR" smtClean="0"/>
-              <a:t>15/12/15</a:t>
+            <a:fld id="{8D32ADDA-B0AB-E047-8C8C-601BF4DFD54D}" type="datetimeFigureOut">
+              <a:rPr lang="fr-FR" smtClean="0"/>
+              <a:t>01/01/16</a:t>
             </a:fld>
-            <a:endParaRPr lang="fr-FR"/>
+            <a:endParaRPr lang="fr-FR" dirty="0"/>
           </a:p>
         </p:txBody>
       </p:sp>
@@ -2275,7 +2275,7 @@
           <a:bodyPr/>
           <a:lstStyle/>
           <a:p>
-            <a:endParaRPr lang="fr-FR"/>
+            <a:endParaRPr lang="fr-FR" dirty="0"/>
           </a:p>
         </p:txBody>
       </p:sp>
@@ -2294,18 +2294,18 @@
           <a:bodyPr/>
           <a:lstStyle/>
           <a:p>
-            <a:fld id="{EB3E5FD4-1617-FB43-AE66-91BF1C30F7D6}" type="slidenum">
+            <a:fld id="{A0AE0A3C-4983-E44E-B5FC-60BEE959FC11}" type="slidenum">
               <a:rPr lang="fr-FR" smtClean="0"/>
               <a:t>‹#›</a:t>
             </a:fld>
-            <a:endParaRPr lang="fr-FR"/>
+            <a:endParaRPr lang="fr-FR" dirty="0"/>
           </a:p>
         </p:txBody>
       </p:sp>
     </p:spTree>
     <p:extLst>
       <p:ext uri="{BB962C8B-B14F-4D97-AF65-F5344CB8AC3E}">
-        <p14:creationId xmlns:p14="http://schemas.microsoft.com/office/powerpoint/2010/main" val="3301352482"/>
+        <p14:creationId xmlns:p14="http://schemas.microsoft.com/office/powerpoint/2010/main" val="957876606"/>
       </p:ext>
     </p:extLst>
   </p:cSld>
@@ -2421,7 +2421,7 @@
             </a:lvl9pPr>
           </a:lstStyle>
           <a:p>
-            <a:endParaRPr lang="fr-FR"/>
+            <a:endParaRPr lang="fr-FR" dirty="0"/>
           </a:p>
         </p:txBody>
       </p:sp>
@@ -2505,11 +2505,11 @@
           <a:bodyPr/>
           <a:lstStyle/>
           <a:p>
-            <a:fld id="{3DCBB16B-DC68-2E4C-AFD5-337D9207E47D}" type="datetimeFigureOut">
-              <a:rPr lang="fr-FR" smtClean="0"/>
-              <a:t>15/12/15</a:t>
+            <a:fld id="{8D32ADDA-B0AB-E047-8C8C-601BF4DFD54D}" type="datetimeFigureOut">
+              <a:rPr lang="fr-FR" smtClean="0"/>
+              <a:t>01/01/16</a:t>
             </a:fld>
-            <a:endParaRPr lang="fr-FR"/>
+            <a:endParaRPr lang="fr-FR" dirty="0"/>
           </a:p>
         </p:txBody>
       </p:sp>
@@ -2528,7 +2528,7 @@
           <a:bodyPr/>
           <a:lstStyle/>
           <a:p>
-            <a:endParaRPr lang="fr-FR"/>
+            <a:endParaRPr lang="fr-FR" dirty="0"/>
           </a:p>
         </p:txBody>
       </p:sp>
@@ -2547,18 +2547,18 @@
           <a:bodyPr/>
           <a:lstStyle/>
           <a:p>
-            <a:fld id="{EB3E5FD4-1617-FB43-AE66-91BF1C30F7D6}" type="slidenum">
+            <a:fld id="{A0AE0A3C-4983-E44E-B5FC-60BEE959FC11}" type="slidenum">
               <a:rPr lang="fr-FR" smtClean="0"/>
               <a:t>‹#›</a:t>
             </a:fld>
-            <a:endParaRPr lang="fr-FR"/>
+            <a:endParaRPr lang="fr-FR" dirty="0"/>
           </a:p>
         </p:txBody>
       </p:sp>
     </p:spTree>
     <p:extLst>
       <p:ext uri="{BB962C8B-B14F-4D97-AF65-F5344CB8AC3E}">
-        <p14:creationId xmlns:p14="http://schemas.microsoft.com/office/powerpoint/2010/main" val="1035874909"/>
+        <p14:creationId xmlns:p14="http://schemas.microsoft.com/office/powerpoint/2010/main" val="3964727568"/>
       </p:ext>
     </p:extLst>
   </p:cSld>
@@ -2718,11 +2718,11 @@
             </a:lvl1pPr>
           </a:lstStyle>
           <a:p>
-            <a:fld id="{3DCBB16B-DC68-2E4C-AFD5-337D9207E47D}" type="datetimeFigureOut">
-              <a:rPr lang="fr-FR" smtClean="0"/>
-              <a:t>15/12/15</a:t>
+            <a:fld id="{8D32ADDA-B0AB-E047-8C8C-601BF4DFD54D}" type="datetimeFigureOut">
+              <a:rPr lang="fr-FR" smtClean="0"/>
+              <a:t>01/01/16</a:t>
             </a:fld>
-            <a:endParaRPr lang="fr-FR"/>
+            <a:endParaRPr lang="fr-FR" dirty="0"/>
           </a:p>
         </p:txBody>
       </p:sp>
@@ -2759,7 +2759,7 @@
             </a:lvl1pPr>
           </a:lstStyle>
           <a:p>
-            <a:endParaRPr lang="fr-FR"/>
+            <a:endParaRPr lang="fr-FR" dirty="0"/>
           </a:p>
         </p:txBody>
       </p:sp>
@@ -2796,18 +2796,18 @@
             </a:lvl1pPr>
           </a:lstStyle>
           <a:p>
-            <a:fld id="{EB3E5FD4-1617-FB43-AE66-91BF1C30F7D6}" type="slidenum">
+            <a:fld id="{A0AE0A3C-4983-E44E-B5FC-60BEE959FC11}" type="slidenum">
               <a:rPr lang="fr-FR" smtClean="0"/>
               <a:t>‹#›</a:t>
             </a:fld>
-            <a:endParaRPr lang="fr-FR"/>
+            <a:endParaRPr lang="fr-FR" dirty="0"/>
           </a:p>
         </p:txBody>
       </p:sp>
     </p:spTree>
     <p:extLst>
       <p:ext uri="{BB962C8B-B14F-4D97-AF65-F5344CB8AC3E}">
-        <p14:creationId xmlns:p14="http://schemas.microsoft.com/office/powerpoint/2010/main" val="2245611825"/>
+        <p14:creationId xmlns:p14="http://schemas.microsoft.com/office/powerpoint/2010/main" val="3788244920"/>
       </p:ext>
     </p:extLst>
   </p:cSld>
@@ -3097,14 +3097,14 @@
       </p:grpSpPr>
       <p:sp>
         <p:nvSpPr>
-          <p:cNvPr id="4" name="ZoneTexte 3"/>
+          <p:cNvPr id="2" name="ZoneTexte 1"/>
           <p:cNvSpPr txBox="1"/>
           <p:nvPr/>
         </p:nvSpPr>
         <p:spPr>
           <a:xfrm>
             <a:off x="3114591" y="2831311"/>
-            <a:ext cx="639770" cy="458634"/>
+            <a:ext cx="842062" cy="458634"/>
           </a:xfrm>
           <a:prstGeom prst="rect">
             <a:avLst/>
@@ -3142,7 +3142,7 @@
       </p:sp>
       <p:sp>
         <p:nvSpPr>
-          <p:cNvPr id="5" name="ZoneTexte 4"/>
+          <p:cNvPr id="3" name="ZoneTexte 2"/>
           <p:cNvSpPr txBox="1"/>
           <p:nvPr/>
         </p:nvSpPr>
@@ -3175,28 +3175,30 @@
           </a:p>
           <a:p>
             <a:pPr algn="ctr"/>
-            <a:endParaRPr lang="fr-FR" sz="800" b="1" smtClean="0"/>
-          </a:p>
-          <a:p>
-            <a:r>
-              <a:rPr lang="fr-FR" sz="800" b="1" smtClean="0"/>
+            <a:endParaRPr lang="fr-FR" sz="800" b="1" dirty="0" smtClean="0"/>
+          </a:p>
+          <a:p>
+            <a:r>
+              <a:rPr lang="fr-FR" sz="800" b="1" dirty="0" err="1" smtClean="0"/>
               <a:t>ID_Groupe</a:t>
             </a:r>
-          </a:p>
-          <a:p>
-            <a:r>
-              <a:rPr lang="fr-FR" sz="800" smtClean="0"/>
+            <a:endParaRPr lang="fr-FR" sz="800" b="1" dirty="0" smtClean="0"/>
+          </a:p>
+          <a:p>
+            <a:r>
+              <a:rPr lang="fr-FR" sz="800" dirty="0" smtClean="0"/>
               <a:t>Groupe</a:t>
             </a:r>
           </a:p>
           <a:p>
             <a:r>
-              <a:rPr lang="fr-FR" sz="800" i="1" smtClean="0"/>
+              <a:rPr lang="fr-FR" sz="800" i="1" dirty="0" err="1" smtClean="0"/>
               <a:t>ID_Clé</a:t>
             </a:r>
-          </a:p>
-          <a:p>
-            <a:endParaRPr lang="fr-FR" sz="800" smtClean="0"/>
+            <a:endParaRPr lang="fr-FR" sz="800" i="1" dirty="0" smtClean="0"/>
+          </a:p>
+          <a:p>
+            <a:endParaRPr lang="fr-FR" sz="800" dirty="0" smtClean="0"/>
           </a:p>
           <a:p>
             <a:pPr algn="ctr"/>
@@ -3206,7 +3208,7 @@
       </p:sp>
       <p:sp>
         <p:nvSpPr>
-          <p:cNvPr id="6" name="ZoneTexte 5"/>
+          <p:cNvPr id="4" name="ZoneTexte 3"/>
           <p:cNvSpPr txBox="1"/>
           <p:nvPr/>
         </p:nvSpPr>
@@ -3280,14 +3282,14 @@
       </p:sp>
       <p:sp>
         <p:nvSpPr>
-          <p:cNvPr id="7" name="ZoneTexte 6"/>
+          <p:cNvPr id="5" name="ZoneTexte 4"/>
           <p:cNvSpPr txBox="1"/>
           <p:nvPr/>
         </p:nvSpPr>
         <p:spPr>
           <a:xfrm>
-            <a:off x="2043178" y="268968"/>
-            <a:ext cx="842063" cy="684072"/>
+            <a:off x="3114591" y="202356"/>
+            <a:ext cx="842063" cy="983210"/>
           </a:xfrm>
           <a:prstGeom prst="rect">
             <a:avLst/>
@@ -3313,7 +3315,7 @@
           </a:p>
           <a:p>
             <a:pPr algn="ctr"/>
-            <a:endParaRPr lang="fr-FR" sz="800" b="1" smtClean="0"/>
+            <a:endParaRPr lang="fr-FR" sz="800" b="1" dirty="0" smtClean="0"/>
           </a:p>
           <a:p>
             <a:r>
@@ -3323,15 +3325,30 @@
           </a:p>
           <a:p>
             <a:r>
+              <a:rPr lang="fr-FR" sz="800" dirty="0" smtClean="0"/>
+              <a:t>IP</a:t>
+            </a:r>
+          </a:p>
+          <a:p>
+            <a:r>
               <a:rPr lang="fr-FR" sz="800" smtClean="0"/>
-              <a:t>IP</a:t>
+              <a:t>Famille</a:t>
             </a:r>
           </a:p>
           <a:p>
             <a:r>
               <a:rPr lang="fr-FR" sz="800" smtClean="0"/>
-              <a:t>Port</a:t>
-            </a:r>
+              <a:t>InternalPort</a:t>
+            </a:r>
+          </a:p>
+          <a:p>
+            <a:r>
+              <a:rPr lang="fr-FR" sz="800" smtClean="0"/>
+              <a:t>ExternalPort</a:t>
+            </a:r>
+          </a:p>
+          <a:p>
+            <a:endParaRPr lang="fr-FR" sz="800" dirty="0" smtClean="0"/>
           </a:p>
           <a:p>
             <a:pPr algn="ctr"/>
@@ -3341,14 +3358,14 @@
       </p:sp>
       <p:sp>
         <p:nvSpPr>
-          <p:cNvPr id="8" name="ZoneTexte 7"/>
+          <p:cNvPr id="6" name="ZoneTexte 5"/>
           <p:cNvSpPr txBox="1"/>
           <p:nvPr/>
         </p:nvSpPr>
         <p:spPr>
           <a:xfrm>
-            <a:off x="2035892" y="1161238"/>
-            <a:ext cx="849350" cy="1289242"/>
+            <a:off x="2035891" y="1114421"/>
+            <a:ext cx="849350" cy="1312202"/>
           </a:xfrm>
           <a:prstGeom prst="rect">
             <a:avLst/>
@@ -3368,66 +3385,76 @@
           <a:p>
             <a:pPr algn="ctr"/>
             <a:r>
-              <a:rPr lang="fr-FR" sz="800" b="1" smtClean="0"/>
+              <a:rPr lang="fr-FR" sz="800" b="1" dirty="0" smtClean="0"/>
               <a:t>Utilisateurs</a:t>
             </a:r>
           </a:p>
           <a:p>
             <a:pPr algn="ctr"/>
-            <a:endParaRPr lang="fr-FR" sz="800" b="1"/>
-          </a:p>
-          <a:p>
-            <a:r>
-              <a:rPr lang="fr-FR" sz="800" b="1" smtClean="0"/>
+            <a:endParaRPr lang="fr-FR" sz="800" b="1" dirty="0"/>
+          </a:p>
+          <a:p>
+            <a:r>
+              <a:rPr lang="fr-FR" sz="800" b="1" noProof="1" smtClean="0"/>
               <a:t>Login</a:t>
             </a:r>
           </a:p>
           <a:p>
             <a:r>
-              <a:rPr lang="fr-FR" sz="800" smtClean="0"/>
+              <a:rPr lang="fr-FR" sz="800" noProof="1" smtClean="0"/>
               <a:t>(Password)</a:t>
             </a:r>
           </a:p>
           <a:p>
             <a:r>
-              <a:rPr lang="fr-FR" sz="800" smtClean="0"/>
+              <a:rPr lang="fr-FR" sz="800" noProof="1" smtClean="0"/>
               <a:t>IP</a:t>
             </a:r>
           </a:p>
           <a:p>
             <a:r>
-              <a:rPr lang="fr-FR" sz="800" smtClean="0"/>
+              <a:rPr lang="fr-FR" sz="800" noProof="1" smtClean="0"/>
               <a:t>Port</a:t>
             </a:r>
           </a:p>
           <a:p>
             <a:r>
-              <a:rPr lang="fr-FR" sz="800" i="1" smtClean="0"/>
+              <a:rPr lang="fr-FR" sz="800" i="1" noProof="1" smtClean="0"/>
               <a:t>ID_Statut</a:t>
             </a:r>
           </a:p>
           <a:p>
             <a:r>
-              <a:rPr lang="fr-FR" sz="800" i="1" smtClean="0"/>
-              <a:t>ID_Affectations</a:t>
-            </a:r>
-          </a:p>
-          <a:p>
-            <a:r>
-              <a:rPr lang="fr-FR" sz="800" i="1" smtClean="0"/>
-              <a:t>Frontale</a:t>
-            </a:r>
-            <a:endParaRPr lang="fr-FR" sz="800" i="1" dirty="0" smtClean="0"/>
-          </a:p>
-          <a:p>
-            <a:pPr algn="ctr"/>
-            <a:endParaRPr lang="fr-FR" sz="800" b="1" dirty="0"/>
-          </a:p>
-        </p:txBody>
-      </p:sp>
-      <p:sp>
-        <p:nvSpPr>
-          <p:cNvPr id="9" name="ZoneTexte 8"/>
+              <a:rPr lang="fr-FR" sz="800" i="1" noProof="1" smtClean="0"/>
+              <a:t>ID_Affectation</a:t>
+            </a:r>
+          </a:p>
+          <a:p>
+            <a:r>
+              <a:rPr lang="fr-FR" sz="800" i="1" noProof="1" smtClean="0"/>
+              <a:t>Frontale </a:t>
+            </a:r>
+          </a:p>
+          <a:p>
+            <a:r>
+              <a:rPr lang="fr-FR" sz="800" i="1" noProof="1">
+                <a:solidFill>
+                  <a:srgbClr val="FF0000"/>
+                </a:solidFill>
+              </a:rPr>
+              <a:t>Metadonnes</a:t>
+            </a:r>
+            <a:endParaRPr lang="fr-FR" sz="800" i="1" dirty="0" smtClean="0">
+              <a:solidFill>
+                <a:srgbClr val="FF0000"/>
+              </a:solidFill>
+            </a:endParaRPr>
+          </a:p>
+        </p:txBody>
+      </p:sp>
+      <p:sp>
+        <p:nvSpPr>
+          <p:cNvPr id="7" name="ZoneTexte 6"/>
           <p:cNvSpPr txBox="1"/>
           <p:nvPr/>
         </p:nvSpPr>
@@ -3500,14 +3527,14 @@
       </p:sp>
       <p:sp>
         <p:nvSpPr>
-          <p:cNvPr id="10" name="ZoneTexte 9"/>
+          <p:cNvPr id="8" name="ZoneTexte 7"/>
           <p:cNvSpPr txBox="1"/>
           <p:nvPr/>
         </p:nvSpPr>
         <p:spPr>
           <a:xfrm>
             <a:off x="2035892" y="2658352"/>
-            <a:ext cx="849350" cy="804551"/>
+            <a:ext cx="849350" cy="1049500"/>
           </a:xfrm>
           <a:prstGeom prst="rect">
             <a:avLst/>
@@ -3527,45 +3554,70 @@
           <a:p>
             <a:pPr algn="ctr"/>
             <a:r>
-              <a:rPr lang="fr-FR" sz="800" b="1" smtClean="0"/>
+              <a:rPr lang="fr-FR" sz="800" b="1" dirty="0" smtClean="0"/>
               <a:t>Donnees</a:t>
             </a:r>
           </a:p>
           <a:p>
             <a:pPr algn="ctr"/>
-            <a:endParaRPr lang="fr-FR" sz="800" b="1"/>
-          </a:p>
-          <a:p>
-            <a:r>
-              <a:rPr lang="fr-FR" sz="800" b="1" smtClean="0"/>
+            <a:endParaRPr lang="fr-FR" sz="800" b="1" dirty="0"/>
+          </a:p>
+          <a:p>
+            <a:r>
+              <a:rPr lang="fr-FR" sz="800" b="1" dirty="0" smtClean="0"/>
               <a:t>ID_Donnee</a:t>
             </a:r>
           </a:p>
           <a:p>
             <a:r>
-              <a:rPr lang="fr-FR" sz="800" i="1" smtClean="0"/>
+              <a:rPr lang="fr-FR" sz="800" i="1" dirty="0" smtClean="0"/>
               <a:t>Login</a:t>
             </a:r>
           </a:p>
           <a:p>
             <a:r>
-              <a:rPr lang="fr-FR" sz="800" i="1" smtClean="0"/>
+              <a:rPr lang="fr-FR" sz="800" i="1" dirty="0" smtClean="0"/>
               <a:t>Type</a:t>
             </a:r>
           </a:p>
           <a:p>
             <a:r>
-              <a:rPr lang="fr-FR" sz="800" smtClean="0"/>
+              <a:rPr lang="fr-FR" sz="800" dirty="0" smtClean="0"/>
               <a:t>Valeur</a:t>
             </a:r>
           </a:p>
           <a:p>
-            <a:endParaRPr lang="fr-FR" sz="800" smtClean="0"/>
+            <a:r>
+              <a:rPr lang="fr-FR" sz="800" i="1" smtClean="0">
+                <a:solidFill>
+                  <a:srgbClr val="FF0000"/>
+                </a:solidFill>
+              </a:rPr>
+              <a:t>RefBD</a:t>
+            </a:r>
+          </a:p>
+          <a:p>
+            <a:r>
+              <a:rPr lang="fr-FR" sz="800" i="1" smtClean="0">
+                <a:solidFill>
+                  <a:srgbClr val="FF0000"/>
+                </a:solidFill>
+              </a:rPr>
+              <a:t>Valeur_Chiffree</a:t>
+            </a:r>
+            <a:endParaRPr lang="fr-FR" sz="800" i="1" dirty="0" smtClean="0">
+              <a:solidFill>
+                <a:srgbClr val="FF0000"/>
+              </a:solidFill>
+            </a:endParaRPr>
           </a:p>
           <a:p>
             <a:endParaRPr lang="fr-FR" sz="800" dirty="0" smtClean="0"/>
           </a:p>
           <a:p>
+            <a:endParaRPr lang="fr-FR" sz="800" dirty="0" smtClean="0"/>
+          </a:p>
+          <a:p>
             <a:pPr algn="ctr"/>
             <a:endParaRPr lang="fr-FR" sz="800" b="1" dirty="0"/>
           </a:p>
@@ -3573,13 +3625,13 @@
       </p:sp>
       <p:sp>
         <p:nvSpPr>
-          <p:cNvPr id="12" name="ZoneTexte 11"/>
+          <p:cNvPr id="9" name="ZoneTexte 8"/>
           <p:cNvSpPr txBox="1"/>
           <p:nvPr/>
         </p:nvSpPr>
         <p:spPr>
           <a:xfrm>
-            <a:off x="4043735" y="281912"/>
+            <a:off x="4281580" y="281912"/>
             <a:ext cx="789521" cy="671128"/>
           </a:xfrm>
           <a:prstGeom prst="rect">
@@ -3602,30 +3654,31 @@
           <a:p>
             <a:pPr algn="ctr"/>
             <a:r>
-              <a:rPr lang="fr-FR" sz="800" b="1" smtClean="0"/>
+              <a:rPr lang="fr-FR" sz="800" b="1" dirty="0" err="1" smtClean="0"/>
               <a:t>NoeudsTOR</a:t>
             </a:r>
             <a:endParaRPr lang="fr-FR" sz="800" b="1" dirty="0" smtClean="0"/>
           </a:p>
           <a:p>
             <a:pPr algn="ctr"/>
-            <a:endParaRPr lang="fr-FR" sz="800" b="1" smtClean="0"/>
-          </a:p>
-          <a:p>
-            <a:r>
-              <a:rPr lang="fr-FR" sz="800" b="1" smtClean="0"/>
+            <a:endParaRPr lang="fr-FR" sz="800" b="1" dirty="0" smtClean="0"/>
+          </a:p>
+          <a:p>
+            <a:r>
+              <a:rPr lang="fr-FR" sz="800" b="1" dirty="0" err="1" smtClean="0"/>
               <a:t>NoeudTOR</a:t>
             </a:r>
-          </a:p>
-          <a:p>
-            <a:r>
-              <a:rPr lang="fr-FR" sz="800" b="1" smtClean="0"/>
+            <a:endParaRPr lang="fr-FR" sz="800" b="1" dirty="0" smtClean="0"/>
+          </a:p>
+          <a:p>
+            <a:r>
+              <a:rPr lang="fr-FR" sz="800" b="1" dirty="0" smtClean="0"/>
               <a:t>IP</a:t>
             </a:r>
           </a:p>
           <a:p>
             <a:r>
-              <a:rPr lang="fr-FR" sz="800" b="1" smtClean="0"/>
+              <a:rPr lang="fr-FR" sz="800" b="1" dirty="0" smtClean="0"/>
               <a:t>port</a:t>
             </a:r>
             <a:endParaRPr lang="fr-FR" sz="800" b="1" dirty="0"/>
@@ -3634,7 +3687,7 @@
       </p:sp>
       <p:sp>
         <p:nvSpPr>
-          <p:cNvPr id="13" name="ZoneTexte 12"/>
+          <p:cNvPr id="10" name="ZoneTexte 9"/>
           <p:cNvSpPr txBox="1"/>
           <p:nvPr/>
         </p:nvSpPr>
@@ -3690,7 +3743,7 @@
       </p:sp>
       <p:sp>
         <p:nvSpPr>
-          <p:cNvPr id="14" name="ZoneTexte 13"/>
+          <p:cNvPr id="11" name="ZoneTexte 10"/>
           <p:cNvSpPr txBox="1"/>
           <p:nvPr/>
         </p:nvSpPr>
@@ -3738,7 +3791,7 @@
           <a:p>
             <a:r>
               <a:rPr lang="fr-FR" sz="800" smtClean="0"/>
-              <a:t>ValeurChiffree</a:t>
+              <a:t>Valeur_Chiffree</a:t>
             </a:r>
           </a:p>
           <a:p>
@@ -3752,14 +3805,14 @@
       </p:sp>
       <p:sp>
         <p:nvSpPr>
-          <p:cNvPr id="15" name="ZoneTexte 14"/>
+          <p:cNvPr id="12" name="ZoneTexte 11"/>
           <p:cNvSpPr txBox="1"/>
           <p:nvPr/>
         </p:nvSpPr>
         <p:spPr>
           <a:xfrm>
-            <a:off x="3114591" y="1808123"/>
-            <a:ext cx="647336" cy="796243"/>
+            <a:off x="3114590" y="1424723"/>
+            <a:ext cx="842063" cy="1179644"/>
           </a:xfrm>
           <a:prstGeom prst="rect">
             <a:avLst/>
@@ -3810,7 +3863,41 @@
               <a:rPr lang="fr-FR" sz="800" i="1" smtClean="0"/>
               <a:t>Politique</a:t>
             </a:r>
-            <a:endParaRPr lang="fr-FR" sz="800" i="1" dirty="0" smtClean="0"/>
+          </a:p>
+          <a:p>
+            <a:r>
+              <a:rPr lang="fr-FR" sz="800" i="1" smtClean="0">
+                <a:solidFill>
+                  <a:srgbClr val="FF0000"/>
+                </a:solidFill>
+              </a:rPr>
+              <a:t>Ksec</a:t>
+            </a:r>
+          </a:p>
+          <a:p>
+            <a:r>
+              <a:rPr lang="fr-FR" sz="800" i="1">
+                <a:solidFill>
+                  <a:srgbClr val="FF0000"/>
+                </a:solidFill>
+              </a:rPr>
+              <a:t>E_Cred_Ksec</a:t>
+            </a:r>
+          </a:p>
+          <a:p>
+            <a:r>
+              <a:rPr lang="fr-FR" sz="800" i="1" noProof="1">
+                <a:solidFill>
+                  <a:srgbClr val="FF0000"/>
+                </a:solidFill>
+              </a:rPr>
+              <a:t>Meta_Chiffrees</a:t>
+            </a:r>
+            <a:endParaRPr lang="fr-FR" sz="800" i="1" dirty="0" smtClean="0">
+              <a:solidFill>
+                <a:srgbClr val="FF0000"/>
+              </a:solidFill>
+            </a:endParaRPr>
           </a:p>
           <a:p>
             <a:pPr algn="ctr"/>
@@ -3820,7 +3907,7 @@
       </p:sp>
       <p:sp>
         <p:nvSpPr>
-          <p:cNvPr id="16" name="ZoneTexte 15"/>
+          <p:cNvPr id="13" name="ZoneTexte 12"/>
           <p:cNvSpPr txBox="1"/>
           <p:nvPr/>
         </p:nvSpPr>
@@ -3883,7 +3970,7 @@
       </p:sp>
       <p:sp>
         <p:nvSpPr>
-          <p:cNvPr id="17" name="ZoneTexte 16"/>
+          <p:cNvPr id="14" name="ZoneTexte 13"/>
           <p:cNvSpPr txBox="1"/>
           <p:nvPr/>
         </p:nvSpPr>
@@ -3958,14 +4045,14 @@
       </p:sp>
       <p:sp>
         <p:nvSpPr>
-          <p:cNvPr id="18" name="ZoneTexte 17"/>
+          <p:cNvPr id="15" name="ZoneTexte 14"/>
           <p:cNvSpPr txBox="1"/>
           <p:nvPr/>
         </p:nvSpPr>
         <p:spPr>
           <a:xfrm>
-            <a:off x="4045711" y="2779667"/>
-            <a:ext cx="787547" cy="554029"/>
+            <a:off x="4283556" y="2779667"/>
+            <a:ext cx="787547" cy="683236"/>
           </a:xfrm>
           <a:prstGeom prst="rect">
             <a:avLst/>
@@ -3985,17 +4072,18 @@
           <a:p>
             <a:pPr algn="ctr"/>
             <a:r>
-              <a:rPr lang="fr-FR" sz="800" b="1" smtClean="0"/>
+              <a:rPr lang="fr-FR" sz="800" b="1" dirty="0" err="1" smtClean="0"/>
               <a:t>Cred_Autorise</a:t>
             </a:r>
-          </a:p>
-          <a:p>
-            <a:pPr algn="ctr"/>
-            <a:endParaRPr lang="fr-FR" sz="800" b="1"/>
-          </a:p>
-          <a:p>
-            <a:r>
-              <a:rPr lang="fr-FR" sz="800" i="1" smtClean="0"/>
+            <a:endParaRPr lang="fr-FR" sz="800" b="1" dirty="0" smtClean="0"/>
+          </a:p>
+          <a:p>
+            <a:pPr algn="ctr"/>
+            <a:endParaRPr lang="fr-FR" sz="800" b="1" dirty="0"/>
+          </a:p>
+          <a:p>
+            <a:r>
+              <a:rPr lang="fr-FR" sz="800" i="1" dirty="0" smtClean="0"/>
               <a:t>Politique</a:t>
             </a:r>
           </a:p>
@@ -4004,13 +4092,27 @@
               <a:rPr lang="fr-FR" sz="800" smtClean="0"/>
               <a:t>Cred_Auto_Ref</a:t>
             </a:r>
-            <a:endParaRPr lang="fr-FR" sz="800" b="1" dirty="0"/>
-          </a:p>
-        </p:txBody>
-      </p:sp>
-      <p:sp>
-        <p:nvSpPr>
-          <p:cNvPr id="19" name="ZoneTexte 18"/>
+          </a:p>
+          <a:p>
+            <a:r>
+              <a:rPr lang="fr-FR" sz="800" i="1">
+                <a:solidFill>
+                  <a:srgbClr val="FF0000"/>
+                </a:solidFill>
+              </a:rPr>
+              <a:t>ID_Cred</a:t>
+            </a:r>
+            <a:endParaRPr lang="fr-FR" sz="800" i="1" dirty="0">
+              <a:solidFill>
+                <a:srgbClr val="FF0000"/>
+              </a:solidFill>
+            </a:endParaRPr>
+          </a:p>
+        </p:txBody>
+      </p:sp>
+      <p:sp>
+        <p:nvSpPr>
+          <p:cNvPr id="16" name="ZoneTexte 15"/>
           <p:cNvSpPr txBox="1"/>
           <p:nvPr/>
         </p:nvSpPr>
@@ -4037,36 +4139,39 @@
           <a:p>
             <a:pPr algn="ctr"/>
             <a:r>
-              <a:rPr lang="fr-FR" sz="800" b="1" smtClean="0"/>
-              <a:t>U_Cles_Types</a:t>
-            </a:r>
-          </a:p>
-          <a:p>
-            <a:pPr algn="ctr"/>
-            <a:endParaRPr lang="fr-FR" sz="800" b="1" smtClean="0"/>
-          </a:p>
-          <a:p>
-            <a:r>
-              <a:rPr lang="fr-FR" sz="800" i="1" smtClean="0"/>
+              <a:rPr lang="fr-FR" sz="800" b="1" dirty="0" err="1" smtClean="0"/>
+              <a:t>Cles_Types</a:t>
+            </a:r>
+            <a:endParaRPr lang="fr-FR" sz="800" b="1" dirty="0" smtClean="0"/>
+          </a:p>
+          <a:p>
+            <a:pPr algn="ctr"/>
+            <a:endParaRPr lang="fr-FR" sz="800" b="1" dirty="0" smtClean="0"/>
+          </a:p>
+          <a:p>
+            <a:r>
+              <a:rPr lang="fr-FR" sz="800" i="1" dirty="0" smtClean="0"/>
               <a:t>Type</a:t>
             </a:r>
           </a:p>
           <a:p>
             <a:r>
-              <a:rPr lang="fr-FR" sz="800" smtClean="0"/>
+              <a:rPr lang="fr-FR" sz="800" dirty="0" err="1" smtClean="0"/>
               <a:t>Cred_Auto_Ref</a:t>
             </a:r>
-          </a:p>
-          <a:p>
-            <a:r>
-              <a:rPr lang="fr-FR" sz="800" smtClean="0"/>
+            <a:endParaRPr lang="fr-FR" sz="800" dirty="0" smtClean="0"/>
+          </a:p>
+          <a:p>
+            <a:r>
+              <a:rPr lang="fr-FR" sz="800" dirty="0" err="1" smtClean="0"/>
               <a:t>E_Cred_Ksec</a:t>
             </a:r>
-          </a:p>
-          <a:p>
             <a:endParaRPr lang="fr-FR" sz="800" dirty="0" smtClean="0"/>
           </a:p>
           <a:p>
+            <a:endParaRPr lang="fr-FR" sz="800" dirty="0" smtClean="0"/>
+          </a:p>
+          <a:p>
             <a:pPr algn="ctr"/>
             <a:endParaRPr lang="fr-FR" sz="800" b="1" dirty="0"/>
           </a:p>
@@ -4074,14 +4179,14 @@
       </p:sp>
       <p:sp>
         <p:nvSpPr>
-          <p:cNvPr id="20" name="ZoneTexte 19"/>
+          <p:cNvPr id="17" name="ZoneTexte 16"/>
           <p:cNvSpPr txBox="1"/>
           <p:nvPr/>
         </p:nvSpPr>
         <p:spPr>
           <a:xfrm>
-            <a:off x="4441845" y="5050774"/>
-            <a:ext cx="430190" cy="432957"/>
+            <a:off x="4282789" y="4925537"/>
+            <a:ext cx="748258" cy="600195"/>
           </a:xfrm>
           <a:prstGeom prst="rect">
             <a:avLst/>
@@ -4101,19 +4206,26 @@
           <a:p>
             <a:pPr algn="ctr"/>
             <a:r>
-              <a:rPr lang="fr-FR" sz="800" b="1" smtClean="0"/>
+              <a:rPr lang="fr-FR" sz="800" b="1" dirty="0" smtClean="0"/>
               <a:t>Types</a:t>
             </a:r>
           </a:p>
           <a:p>
             <a:pPr algn="ctr"/>
-            <a:endParaRPr lang="fr-FR" sz="800" i="1" smtClean="0"/>
-          </a:p>
-          <a:p>
-            <a:r>
-              <a:rPr lang="fr-FR" sz="800" b="1" smtClean="0"/>
+            <a:endParaRPr lang="fr-FR" sz="800" i="1" dirty="0" smtClean="0"/>
+          </a:p>
+          <a:p>
+            <a:r>
+              <a:rPr lang="fr-FR" sz="800" b="1" dirty="0" smtClean="0"/>
               <a:t>Type</a:t>
             </a:r>
+          </a:p>
+          <a:p>
+            <a:r>
+              <a:rPr lang="fr-FR" sz="800" dirty="0" err="1" smtClean="0"/>
+              <a:t>Meta_Chiffrees</a:t>
+            </a:r>
+            <a:endParaRPr lang="fr-FR" sz="800" dirty="0" smtClean="0"/>
           </a:p>
           <a:p>
             <a:pPr algn="ctr"/>
@@ -4123,17 +4235,17 @@
       </p:sp>
       <p:cxnSp>
         <p:nvCxnSpPr>
-          <p:cNvPr id="22" name="Connecteur droit 21"/>
+          <p:cNvPr id="18" name="Connecteur droit 17"/>
           <p:cNvCxnSpPr>
-            <a:stCxn id="14" idx="2"/>
-            <a:endCxn id="20" idx="0"/>
+            <a:stCxn id="11" idx="2"/>
+            <a:endCxn id="17" idx="0"/>
           </p:cNvCxnSpPr>
           <p:nvPr/>
         </p:nvCxnSpPr>
         <p:spPr>
-          <a:xfrm>
-            <a:off x="4656940" y="4628177"/>
-            <a:ext cx="0" cy="422597"/>
+          <a:xfrm flipH="1">
+            <a:off x="4656918" y="4628177"/>
+            <a:ext cx="22" cy="297360"/>
           </a:xfrm>
           <a:prstGeom prst="line">
             <a:avLst/>
@@ -4163,17 +4275,256 @@
       </p:cxnSp>
       <p:cxnSp>
         <p:nvCxnSpPr>
-          <p:cNvPr id="23" name="Connecteur droit 22"/>
+          <p:cNvPr id="19" name="Connecteur droit 18"/>
           <p:cNvCxnSpPr>
-            <a:stCxn id="19" idx="0"/>
-            <a:endCxn id="20" idx="2"/>
+            <a:stCxn id="16" idx="0"/>
+            <a:endCxn id="17" idx="2"/>
           </p:cNvCxnSpPr>
           <p:nvPr/>
         </p:nvCxnSpPr>
         <p:spPr>
+          <a:xfrm flipH="1" flipV="1">
+            <a:off x="4656918" y="5525732"/>
+            <a:ext cx="22" cy="239118"/>
+          </a:xfrm>
+          <a:prstGeom prst="line">
+            <a:avLst/>
+          </a:prstGeom>
+          <a:ln w="3175" cmpd="sng">
+            <a:solidFill>
+              <a:srgbClr val="000000"/>
+            </a:solidFill>
+            <a:headEnd type="none"/>
+            <a:tailEnd type="triangle"/>
+          </a:ln>
+        </p:spPr>
+        <p:style>
+          <a:lnRef idx="2">
+            <a:schemeClr val="accent1"/>
+          </a:lnRef>
+          <a:fillRef idx="0">
+            <a:schemeClr val="accent1"/>
+          </a:fillRef>
+          <a:effectRef idx="1">
+            <a:schemeClr val="accent1"/>
+          </a:effectRef>
+          <a:fontRef idx="minor">
+            <a:schemeClr val="tx1"/>
+          </a:fontRef>
+        </p:style>
+      </p:cxnSp>
+      <p:cxnSp>
+        <p:nvCxnSpPr>
+          <p:cNvPr id="20" name="Connecteur droit 19"/>
+          <p:cNvCxnSpPr>
+            <a:stCxn id="13" idx="3"/>
+            <a:endCxn id="14" idx="1"/>
+          </p:cNvCxnSpPr>
+          <p:nvPr/>
+        </p:nvCxnSpPr>
+        <p:spPr>
           <a:xfrm flipV="1">
-            <a:off x="4656940" y="5483731"/>
-            <a:ext cx="0" cy="281119"/>
+            <a:off x="1004299" y="4346529"/>
+            <a:ext cx="443590" cy="2137"/>
+          </a:xfrm>
+          <a:prstGeom prst="line">
+            <a:avLst/>
+          </a:prstGeom>
+          <a:ln w="3175" cmpd="sng">
+            <a:solidFill>
+              <a:srgbClr val="000000"/>
+            </a:solidFill>
+            <a:headEnd type="none"/>
+            <a:tailEnd type="triangle"/>
+          </a:ln>
+        </p:spPr>
+        <p:style>
+          <a:lnRef idx="2">
+            <a:schemeClr val="accent1"/>
+          </a:lnRef>
+          <a:fillRef idx="0">
+            <a:schemeClr val="accent1"/>
+          </a:fillRef>
+          <a:effectRef idx="1">
+            <a:schemeClr val="accent1"/>
+          </a:effectRef>
+          <a:fontRef idx="minor">
+            <a:schemeClr val="tx1"/>
+          </a:fontRef>
+        </p:style>
+      </p:cxnSp>
+      <p:cxnSp>
+        <p:nvCxnSpPr>
+          <p:cNvPr id="21" name="Connecteur droit 29"/>
+          <p:cNvCxnSpPr>
+            <a:stCxn id="6" idx="1"/>
+            <a:endCxn id="7" idx="3"/>
+          </p:cNvCxnSpPr>
+          <p:nvPr/>
+        </p:nvCxnSpPr>
+        <p:spPr>
+          <a:xfrm flipH="1">
+            <a:off x="1723574" y="1770522"/>
+            <a:ext cx="312317" cy="1290106"/>
+          </a:xfrm>
+          <a:prstGeom prst="straightConnector1">
+            <a:avLst/>
+          </a:prstGeom>
+          <a:ln w="3175" cmpd="sng">
+            <a:solidFill>
+              <a:srgbClr val="000000"/>
+            </a:solidFill>
+            <a:headEnd type="none"/>
+            <a:tailEnd type="triangle"/>
+          </a:ln>
+        </p:spPr>
+        <p:style>
+          <a:lnRef idx="2">
+            <a:schemeClr val="accent1"/>
+          </a:lnRef>
+          <a:fillRef idx="0">
+            <a:schemeClr val="accent1"/>
+          </a:fillRef>
+          <a:effectRef idx="1">
+            <a:schemeClr val="accent1"/>
+          </a:effectRef>
+          <a:fontRef idx="minor">
+            <a:schemeClr val="tx1"/>
+          </a:fontRef>
+        </p:style>
+      </p:cxnSp>
+      <p:cxnSp>
+        <p:nvCxnSpPr>
+          <p:cNvPr id="22" name="Connecteur droit 30"/>
+          <p:cNvCxnSpPr>
+            <a:stCxn id="6" idx="1"/>
+            <a:endCxn id="4" idx="3"/>
+          </p:cNvCxnSpPr>
+          <p:nvPr/>
+        </p:nvCxnSpPr>
+        <p:spPr>
+          <a:xfrm flipH="1">
+            <a:off x="1723574" y="1770522"/>
+            <a:ext cx="312317" cy="427029"/>
+          </a:xfrm>
+          <a:prstGeom prst="straightConnector1">
+            <a:avLst/>
+          </a:prstGeom>
+          <a:ln w="3175" cmpd="sng">
+            <a:solidFill>
+              <a:srgbClr val="000000"/>
+            </a:solidFill>
+            <a:headEnd type="none"/>
+            <a:tailEnd type="triangle"/>
+          </a:ln>
+        </p:spPr>
+        <p:style>
+          <a:lnRef idx="2">
+            <a:schemeClr val="accent1"/>
+          </a:lnRef>
+          <a:fillRef idx="0">
+            <a:schemeClr val="accent1"/>
+          </a:fillRef>
+          <a:effectRef idx="1">
+            <a:schemeClr val="accent1"/>
+          </a:effectRef>
+          <a:fontRef idx="minor">
+            <a:schemeClr val="tx1"/>
+          </a:fontRef>
+        </p:style>
+      </p:cxnSp>
+      <p:cxnSp>
+        <p:nvCxnSpPr>
+          <p:cNvPr id="23" name="Connecteur droit 31"/>
+          <p:cNvCxnSpPr>
+            <a:stCxn id="10" idx="3"/>
+            <a:endCxn id="6" idx="1"/>
+          </p:cNvCxnSpPr>
+          <p:nvPr/>
+        </p:nvCxnSpPr>
+        <p:spPr>
+          <a:xfrm>
+            <a:off x="1723573" y="544392"/>
+            <a:ext cx="312318" cy="1226130"/>
+          </a:xfrm>
+          <a:prstGeom prst="straightConnector1">
+            <a:avLst/>
+          </a:prstGeom>
+          <a:ln w="3175" cmpd="sng">
+            <a:solidFill>
+              <a:srgbClr val="000000"/>
+            </a:solidFill>
+            <a:headEnd type="none"/>
+            <a:tailEnd type="triangle"/>
+          </a:ln>
+        </p:spPr>
+        <p:style>
+          <a:lnRef idx="2">
+            <a:schemeClr val="accent1"/>
+          </a:lnRef>
+          <a:fillRef idx="0">
+            <a:schemeClr val="accent1"/>
+          </a:fillRef>
+          <a:effectRef idx="1">
+            <a:schemeClr val="accent1"/>
+          </a:effectRef>
+          <a:fontRef idx="minor">
+            <a:schemeClr val="tx1"/>
+          </a:fontRef>
+        </p:style>
+      </p:cxnSp>
+      <p:cxnSp>
+        <p:nvCxnSpPr>
+          <p:cNvPr id="24" name="Connecteur droit 23"/>
+          <p:cNvCxnSpPr>
+            <a:stCxn id="12" idx="1"/>
+            <a:endCxn id="6" idx="3"/>
+          </p:cNvCxnSpPr>
+          <p:nvPr/>
+        </p:nvCxnSpPr>
+        <p:spPr>
+          <a:xfrm flipH="1" flipV="1">
+            <a:off x="2885241" y="1770522"/>
+            <a:ext cx="229349" cy="244023"/>
+          </a:xfrm>
+          <a:prstGeom prst="line">
+            <a:avLst/>
+          </a:prstGeom>
+          <a:ln w="3175" cmpd="sng">
+            <a:solidFill>
+              <a:srgbClr val="000000"/>
+            </a:solidFill>
+            <a:headEnd type="none"/>
+            <a:tailEnd type="triangle"/>
+          </a:ln>
+        </p:spPr>
+        <p:style>
+          <a:lnRef idx="2">
+            <a:schemeClr val="accent1"/>
+          </a:lnRef>
+          <a:fillRef idx="0">
+            <a:schemeClr val="accent1"/>
+          </a:fillRef>
+          <a:effectRef idx="1">
+            <a:schemeClr val="accent1"/>
+          </a:effectRef>
+          <a:fontRef idx="minor">
+            <a:schemeClr val="tx1"/>
+          </a:fontRef>
+        </p:style>
+      </p:cxnSp>
+      <p:cxnSp>
+        <p:nvCxnSpPr>
+          <p:cNvPr id="25" name="Connecteur droit 24"/>
+          <p:cNvCxnSpPr>
+            <a:endCxn id="5" idx="2"/>
+          </p:cNvCxnSpPr>
+          <p:nvPr/>
+        </p:nvCxnSpPr>
+        <p:spPr>
+          <a:xfrm flipV="1">
+            <a:off x="2885241" y="1185566"/>
+            <a:ext cx="650382" cy="239157"/>
           </a:xfrm>
           <a:prstGeom prst="line">
             <a:avLst/>
@@ -4205,17 +4556,137 @@
         <p:nvCxnSpPr>
           <p:cNvPr id="26" name="Connecteur droit 25"/>
           <p:cNvCxnSpPr>
-            <a:stCxn id="16" idx="3"/>
-            <a:endCxn id="17" idx="1"/>
+            <a:stCxn id="12" idx="2"/>
+            <a:endCxn id="2" idx="0"/>
           </p:cNvCxnSpPr>
           <p:nvPr/>
         </p:nvCxnSpPr>
         <p:spPr>
+          <a:xfrm>
+            <a:off x="3535622" y="2604367"/>
+            <a:ext cx="0" cy="226944"/>
+          </a:xfrm>
+          <a:prstGeom prst="line">
+            <a:avLst/>
+          </a:prstGeom>
+          <a:ln w="3175" cmpd="sng">
+            <a:solidFill>
+              <a:srgbClr val="000000"/>
+            </a:solidFill>
+            <a:headEnd type="none"/>
+            <a:tailEnd type="triangle"/>
+          </a:ln>
+        </p:spPr>
+        <p:style>
+          <a:lnRef idx="2">
+            <a:schemeClr val="accent1"/>
+          </a:lnRef>
+          <a:fillRef idx="0">
+            <a:schemeClr val="accent1"/>
+          </a:fillRef>
+          <a:effectRef idx="1">
+            <a:schemeClr val="accent1"/>
+          </a:effectRef>
+          <a:fontRef idx="minor">
+            <a:schemeClr val="tx1"/>
+          </a:fontRef>
+        </p:style>
+      </p:cxnSp>
+      <p:cxnSp>
+        <p:nvCxnSpPr>
+          <p:cNvPr id="27" name="Connecteur droit 26"/>
+          <p:cNvCxnSpPr>
+            <a:stCxn id="15" idx="0"/>
+            <a:endCxn id="31" idx="2"/>
+          </p:cNvCxnSpPr>
+          <p:nvPr/>
+        </p:nvCxnSpPr>
+        <p:spPr>
           <a:xfrm flipV="1">
-            <a:off x="1004299" y="4346529"/>
-            <a:ext cx="443590" cy="2137"/>
+            <a:off x="4677330" y="2481982"/>
+            <a:ext cx="0" cy="297685"/>
           </a:xfrm>
           <a:prstGeom prst="line">
+            <a:avLst/>
+          </a:prstGeom>
+          <a:ln w="3175" cmpd="sng">
+            <a:solidFill>
+              <a:srgbClr val="000000"/>
+            </a:solidFill>
+            <a:headEnd type="none"/>
+            <a:tailEnd type="triangle"/>
+          </a:ln>
+        </p:spPr>
+        <p:style>
+          <a:lnRef idx="2">
+            <a:schemeClr val="accent1"/>
+          </a:lnRef>
+          <a:fillRef idx="0">
+            <a:schemeClr val="accent1"/>
+          </a:fillRef>
+          <a:effectRef idx="1">
+            <a:schemeClr val="accent1"/>
+          </a:effectRef>
+          <a:fontRef idx="minor">
+            <a:schemeClr val="tx1"/>
+          </a:fontRef>
+        </p:style>
+      </p:cxnSp>
+      <p:cxnSp>
+        <p:nvCxnSpPr>
+          <p:cNvPr id="28" name="Connecteur droit 27"/>
+          <p:cNvCxnSpPr>
+            <a:stCxn id="8" idx="0"/>
+            <a:endCxn id="6" idx="2"/>
+          </p:cNvCxnSpPr>
+          <p:nvPr/>
+        </p:nvCxnSpPr>
+        <p:spPr>
+          <a:xfrm flipH="1" flipV="1">
+            <a:off x="2460566" y="2426623"/>
+            <a:ext cx="1" cy="231729"/>
+          </a:xfrm>
+          <a:prstGeom prst="line">
+            <a:avLst/>
+          </a:prstGeom>
+          <a:ln w="3175" cmpd="sng">
+            <a:solidFill>
+              <a:srgbClr val="000000"/>
+            </a:solidFill>
+            <a:headEnd type="none"/>
+            <a:tailEnd type="triangle"/>
+          </a:ln>
+        </p:spPr>
+        <p:style>
+          <a:lnRef idx="2">
+            <a:schemeClr val="accent1"/>
+          </a:lnRef>
+          <a:fillRef idx="0">
+            <a:schemeClr val="accent1"/>
+          </a:fillRef>
+          <a:effectRef idx="1">
+            <a:schemeClr val="accent1"/>
+          </a:effectRef>
+          <a:fontRef idx="minor">
+            <a:schemeClr val="tx1"/>
+          </a:fontRef>
+        </p:style>
+      </p:cxnSp>
+      <p:cxnSp>
+        <p:nvCxnSpPr>
+          <p:cNvPr id="29" name="Connecteur droit 78"/>
+          <p:cNvCxnSpPr>
+            <a:stCxn id="8" idx="3"/>
+            <a:endCxn id="2" idx="1"/>
+          </p:cNvCxnSpPr>
+          <p:nvPr/>
+        </p:nvCxnSpPr>
+        <p:spPr>
+          <a:xfrm flipV="1">
+            <a:off x="2885242" y="3060628"/>
+            <a:ext cx="229349" cy="122474"/>
+          </a:xfrm>
+          <a:prstGeom prst="straightConnector1">
             <a:avLst/>
           </a:prstGeom>
           <a:ln w="3175" cmpd="sng">
@@ -4245,17 +4716,17 @@
         <p:nvCxnSpPr>
           <p:cNvPr id="30" name="Connecteur droit 29"/>
           <p:cNvCxnSpPr>
-            <a:stCxn id="8" idx="1"/>
-            <a:endCxn id="9" idx="3"/>
+            <a:stCxn id="10" idx="2"/>
+            <a:endCxn id="3" idx="0"/>
           </p:cNvCxnSpPr>
           <p:nvPr/>
         </p:nvCxnSpPr>
         <p:spPr>
           <a:xfrm flipH="1">
-            <a:off x="1723574" y="1805859"/>
-            <a:ext cx="312318" cy="1254769"/>
-          </a:xfrm>
-          <a:prstGeom prst="straightConnector1">
+            <a:off x="1365081" y="819815"/>
+            <a:ext cx="1" cy="170220"/>
+          </a:xfrm>
+          <a:prstGeom prst="line">
             <a:avLst/>
           </a:prstGeom>
           <a:ln w="3175" cmpd="sng">
@@ -4281,21 +4752,73 @@
           </a:fontRef>
         </p:style>
       </p:cxnSp>
+      <p:sp>
+        <p:nvSpPr>
+          <p:cNvPr id="31" name="ZoneTexte 30"/>
+          <p:cNvSpPr txBox="1"/>
+          <p:nvPr/>
+        </p:nvSpPr>
+        <p:spPr>
+          <a:xfrm>
+            <a:off x="4283556" y="1927953"/>
+            <a:ext cx="787547" cy="554029"/>
+          </a:xfrm>
+          <a:prstGeom prst="rect">
+            <a:avLst/>
+          </a:prstGeom>
+          <a:noFill/>
+          <a:ln>
+            <a:solidFill>
+              <a:schemeClr val="tx1"/>
+            </a:solidFill>
+          </a:ln>
+        </p:spPr>
+        <p:txBody>
+          <a:bodyPr wrap="square" lIns="36000" tIns="36000" rIns="36000" bIns="36000" rtlCol="0">
+            <a:noAutofit/>
+          </a:bodyPr>
+          <a:lstStyle/>
+          <a:p>
+            <a:pPr algn="ctr"/>
+            <a:r>
+              <a:rPr lang="fr-FR" sz="800" b="1" smtClean="0"/>
+              <a:t>Politiques</a:t>
+            </a:r>
+          </a:p>
+          <a:p>
+            <a:pPr algn="ctr"/>
+            <a:endParaRPr lang="fr-FR" sz="800" b="1"/>
+          </a:p>
+          <a:p>
+            <a:r>
+              <a:rPr lang="fr-FR" sz="800" b="1" smtClean="0"/>
+              <a:t>Politique</a:t>
+            </a:r>
+          </a:p>
+          <a:p>
+            <a:r>
+              <a:rPr lang="fr-FR" sz="800" smtClean="0"/>
+              <a:t>Expression</a:t>
+            </a:r>
+            <a:endParaRPr lang="fr-FR" sz="800" b="1" dirty="0"/>
+          </a:p>
+        </p:txBody>
+      </p:sp>
       <p:cxnSp>
         <p:nvCxnSpPr>
-          <p:cNvPr id="31" name="Connecteur droit 30"/>
+          <p:cNvPr id="32" name="Connecteur droit 31"/>
           <p:cNvCxnSpPr>
-            <a:stCxn id="8" idx="1"/>
-            <a:endCxn id="6" idx="3"/>
+            <a:stCxn id="12" idx="3"/>
+            <a:endCxn id="31" idx="1"/>
           </p:cNvCxnSpPr>
           <p:nvPr/>
         </p:nvCxnSpPr>
         <p:spPr>
-          <a:xfrm flipH="1">
-            <a:off x="1723574" y="1805859"/>
-            <a:ext cx="312318" cy="391692"/>
-          </a:xfrm>
-          <a:prstGeom prst="straightConnector1">
+          <a:xfrm>
+            <a:off x="3956653" y="2014545"/>
+            <a:ext cx="326903" cy="190423"/>
+          </a:xfrm>
+          <a:prstGeom prst="line">
             <a:avLst/>
           </a:prstGeom>
           <a:ln w="3175" cmpd="sng">
@@ -4321,421 +4844,9 @@
           </a:fontRef>
         </p:style>
       </p:cxnSp>
-      <p:cxnSp>
-        <p:nvCxnSpPr>
-          <p:cNvPr id="32" name="Connecteur droit 31"/>
-          <p:cNvCxnSpPr>
-            <a:stCxn id="13" idx="3"/>
-            <a:endCxn id="8" idx="1"/>
-          </p:cNvCxnSpPr>
-          <p:nvPr/>
-        </p:nvCxnSpPr>
-        <p:spPr>
-          <a:xfrm>
-            <a:off x="1723573" y="544392"/>
-            <a:ext cx="312319" cy="1261467"/>
-          </a:xfrm>
-          <a:prstGeom prst="straightConnector1">
-            <a:avLst/>
-          </a:prstGeom>
-          <a:ln w="3175" cmpd="sng">
-            <a:solidFill>
-              <a:srgbClr val="000000"/>
-            </a:solidFill>
-            <a:headEnd type="none"/>
-            <a:tailEnd type="triangle"/>
-          </a:ln>
-        </p:spPr>
-        <p:style>
-          <a:lnRef idx="2">
-            <a:schemeClr val="accent1"/>
-          </a:lnRef>
-          <a:fillRef idx="0">
-            <a:schemeClr val="accent1"/>
-          </a:fillRef>
-          <a:effectRef idx="1">
-            <a:schemeClr val="accent1"/>
-          </a:effectRef>
-          <a:fontRef idx="minor">
-            <a:schemeClr val="tx1"/>
-          </a:fontRef>
-        </p:style>
-      </p:cxnSp>
-      <p:cxnSp>
-        <p:nvCxnSpPr>
-          <p:cNvPr id="34" name="Connecteur droit 33"/>
-          <p:cNvCxnSpPr>
-            <a:stCxn id="15" idx="1"/>
-            <a:endCxn id="8" idx="3"/>
-          </p:cNvCxnSpPr>
-          <p:nvPr/>
-        </p:nvCxnSpPr>
-        <p:spPr>
-          <a:xfrm flipH="1" flipV="1">
-            <a:off x="2885242" y="1805859"/>
-            <a:ext cx="229349" cy="400386"/>
-          </a:xfrm>
-          <a:prstGeom prst="line">
-            <a:avLst/>
-          </a:prstGeom>
-          <a:ln w="3175" cmpd="sng">
-            <a:solidFill>
-              <a:srgbClr val="000000"/>
-            </a:solidFill>
-            <a:headEnd type="none"/>
-            <a:tailEnd type="triangle"/>
-          </a:ln>
-        </p:spPr>
-        <p:style>
-          <a:lnRef idx="2">
-            <a:schemeClr val="accent1"/>
-          </a:lnRef>
-          <a:fillRef idx="0">
-            <a:schemeClr val="accent1"/>
-          </a:fillRef>
-          <a:effectRef idx="1">
-            <a:schemeClr val="accent1"/>
-          </a:effectRef>
-          <a:fontRef idx="minor">
-            <a:schemeClr val="tx1"/>
-          </a:fontRef>
-        </p:style>
-      </p:cxnSp>
-      <p:cxnSp>
-        <p:nvCxnSpPr>
-          <p:cNvPr id="35" name="Connecteur droit 34"/>
-          <p:cNvCxnSpPr>
-            <a:stCxn id="8" idx="0"/>
-            <a:endCxn id="7" idx="2"/>
-          </p:cNvCxnSpPr>
-          <p:nvPr/>
-        </p:nvCxnSpPr>
-        <p:spPr>
-          <a:xfrm flipV="1">
-            <a:off x="2460567" y="953040"/>
-            <a:ext cx="3643" cy="208198"/>
-          </a:xfrm>
-          <a:prstGeom prst="line">
-            <a:avLst/>
-          </a:prstGeom>
-          <a:ln w="3175" cmpd="sng">
-            <a:solidFill>
-              <a:srgbClr val="000000"/>
-            </a:solidFill>
-            <a:headEnd type="none"/>
-            <a:tailEnd type="triangle"/>
-          </a:ln>
-        </p:spPr>
-        <p:style>
-          <a:lnRef idx="2">
-            <a:schemeClr val="accent1"/>
-          </a:lnRef>
-          <a:fillRef idx="0">
-            <a:schemeClr val="accent1"/>
-          </a:fillRef>
-          <a:effectRef idx="1">
-            <a:schemeClr val="accent1"/>
-          </a:effectRef>
-          <a:fontRef idx="minor">
-            <a:schemeClr val="tx1"/>
-          </a:fontRef>
-        </p:style>
-      </p:cxnSp>
-      <p:cxnSp>
-        <p:nvCxnSpPr>
-          <p:cNvPr id="36" name="Connecteur droit 35"/>
-          <p:cNvCxnSpPr>
-            <a:stCxn id="15" idx="2"/>
-            <a:endCxn id="4" idx="0"/>
-          </p:cNvCxnSpPr>
-          <p:nvPr/>
-        </p:nvCxnSpPr>
-        <p:spPr>
-          <a:xfrm flipH="1">
-            <a:off x="3434476" y="2604366"/>
-            <a:ext cx="3783" cy="226945"/>
-          </a:xfrm>
-          <a:prstGeom prst="line">
-            <a:avLst/>
-          </a:prstGeom>
-          <a:ln w="3175" cmpd="sng">
-            <a:solidFill>
-              <a:srgbClr val="000000"/>
-            </a:solidFill>
-            <a:headEnd type="none"/>
-            <a:tailEnd type="triangle"/>
-          </a:ln>
-        </p:spPr>
-        <p:style>
-          <a:lnRef idx="2">
-            <a:schemeClr val="accent1"/>
-          </a:lnRef>
-          <a:fillRef idx="0">
-            <a:schemeClr val="accent1"/>
-          </a:fillRef>
-          <a:effectRef idx="1">
-            <a:schemeClr val="accent1"/>
-          </a:effectRef>
-          <a:fontRef idx="minor">
-            <a:schemeClr val="tx1"/>
-          </a:fontRef>
-        </p:style>
-      </p:cxnSp>
-      <p:cxnSp>
-        <p:nvCxnSpPr>
-          <p:cNvPr id="68" name="Connecteur droit 67"/>
-          <p:cNvCxnSpPr>
-            <a:stCxn id="18" idx="0"/>
-            <a:endCxn id="190" idx="2"/>
-          </p:cNvCxnSpPr>
-          <p:nvPr/>
-        </p:nvCxnSpPr>
-        <p:spPr>
-          <a:xfrm flipV="1">
-            <a:off x="4439485" y="2481982"/>
-            <a:ext cx="0" cy="297685"/>
-          </a:xfrm>
-          <a:prstGeom prst="line">
-            <a:avLst/>
-          </a:prstGeom>
-          <a:ln w="3175" cmpd="sng">
-            <a:solidFill>
-              <a:srgbClr val="000000"/>
-            </a:solidFill>
-            <a:headEnd type="none"/>
-            <a:tailEnd type="triangle"/>
-          </a:ln>
-        </p:spPr>
-        <p:style>
-          <a:lnRef idx="2">
-            <a:schemeClr val="accent1"/>
-          </a:lnRef>
-          <a:fillRef idx="0">
-            <a:schemeClr val="accent1"/>
-          </a:fillRef>
-          <a:effectRef idx="1">
-            <a:schemeClr val="accent1"/>
-          </a:effectRef>
-          <a:fontRef idx="minor">
-            <a:schemeClr val="tx1"/>
-          </a:fontRef>
-        </p:style>
-      </p:cxnSp>
-      <p:cxnSp>
-        <p:nvCxnSpPr>
-          <p:cNvPr id="76" name="Connecteur droit 75"/>
-          <p:cNvCxnSpPr>
-            <a:stCxn id="10" idx="0"/>
-            <a:endCxn id="8" idx="2"/>
-          </p:cNvCxnSpPr>
-          <p:nvPr/>
-        </p:nvCxnSpPr>
-        <p:spPr>
-          <a:xfrm flipV="1">
-            <a:off x="2460567" y="2450480"/>
-            <a:ext cx="0" cy="207872"/>
-          </a:xfrm>
-          <a:prstGeom prst="line">
-            <a:avLst/>
-          </a:prstGeom>
-          <a:ln w="3175" cmpd="sng">
-            <a:solidFill>
-              <a:srgbClr val="000000"/>
-            </a:solidFill>
-            <a:headEnd type="none"/>
-            <a:tailEnd type="triangle"/>
-          </a:ln>
-        </p:spPr>
-        <p:style>
-          <a:lnRef idx="2">
-            <a:schemeClr val="accent1"/>
-          </a:lnRef>
-          <a:fillRef idx="0">
-            <a:schemeClr val="accent1"/>
-          </a:fillRef>
-          <a:effectRef idx="1">
-            <a:schemeClr val="accent1"/>
-          </a:effectRef>
-          <a:fontRef idx="minor">
-            <a:schemeClr val="tx1"/>
-          </a:fontRef>
-        </p:style>
-      </p:cxnSp>
-      <p:cxnSp>
-        <p:nvCxnSpPr>
-          <p:cNvPr id="79" name="Connecteur droit 78"/>
-          <p:cNvCxnSpPr>
-            <a:stCxn id="10" idx="3"/>
-            <a:endCxn id="4" idx="1"/>
-          </p:cNvCxnSpPr>
-          <p:nvPr/>
-        </p:nvCxnSpPr>
-        <p:spPr>
-          <a:xfrm>
-            <a:off x="2885242" y="3060628"/>
-            <a:ext cx="229349" cy="0"/>
-          </a:xfrm>
-          <a:prstGeom prst="straightConnector1">
-            <a:avLst/>
-          </a:prstGeom>
-          <a:ln w="3175" cmpd="sng">
-            <a:solidFill>
-              <a:srgbClr val="000000"/>
-            </a:solidFill>
-            <a:headEnd type="none"/>
-            <a:tailEnd type="triangle"/>
-          </a:ln>
-        </p:spPr>
-        <p:style>
-          <a:lnRef idx="2">
-            <a:schemeClr val="accent1"/>
-          </a:lnRef>
-          <a:fillRef idx="0">
-            <a:schemeClr val="accent1"/>
-          </a:fillRef>
-          <a:effectRef idx="1">
-            <a:schemeClr val="accent1"/>
-          </a:effectRef>
-          <a:fontRef idx="minor">
-            <a:schemeClr val="tx1"/>
-          </a:fontRef>
-        </p:style>
-      </p:cxnSp>
-      <p:cxnSp>
-        <p:nvCxnSpPr>
-          <p:cNvPr id="179" name="Connecteur droit 178"/>
-          <p:cNvCxnSpPr>
-            <a:stCxn id="13" idx="2"/>
-            <a:endCxn id="5" idx="0"/>
-          </p:cNvCxnSpPr>
-          <p:nvPr/>
-        </p:nvCxnSpPr>
-        <p:spPr>
-          <a:xfrm flipH="1">
-            <a:off x="1365081" y="819815"/>
-            <a:ext cx="1" cy="170220"/>
-          </a:xfrm>
-          <a:prstGeom prst="line">
-            <a:avLst/>
-          </a:prstGeom>
-          <a:ln w="3175" cmpd="sng">
-            <a:solidFill>
-              <a:srgbClr val="000000"/>
-            </a:solidFill>
-            <a:headEnd type="none"/>
-            <a:tailEnd type="triangle"/>
-          </a:ln>
-        </p:spPr>
-        <p:style>
-          <a:lnRef idx="2">
-            <a:schemeClr val="accent1"/>
-          </a:lnRef>
-          <a:fillRef idx="0">
-            <a:schemeClr val="accent1"/>
-          </a:fillRef>
-          <a:effectRef idx="1">
-            <a:schemeClr val="accent1"/>
-          </a:effectRef>
-          <a:fontRef idx="minor">
-            <a:schemeClr val="tx1"/>
-          </a:fontRef>
-        </p:style>
-      </p:cxnSp>
-      <p:sp>
-        <p:nvSpPr>
-          <p:cNvPr id="190" name="ZoneTexte 189"/>
-          <p:cNvSpPr txBox="1"/>
-          <p:nvPr/>
-        </p:nvSpPr>
-        <p:spPr>
-          <a:xfrm>
-            <a:off x="4045711" y="1927953"/>
-            <a:ext cx="787547" cy="554029"/>
-          </a:xfrm>
-          <a:prstGeom prst="rect">
-            <a:avLst/>
-          </a:prstGeom>
-          <a:noFill/>
-          <a:ln>
-            <a:solidFill>
-              <a:schemeClr val="tx1"/>
-            </a:solidFill>
-          </a:ln>
-        </p:spPr>
-        <p:txBody>
-          <a:bodyPr wrap="square" lIns="36000" tIns="36000" rIns="36000" bIns="36000" rtlCol="0">
-            <a:noAutofit/>
-          </a:bodyPr>
-          <a:lstStyle/>
-          <a:p>
-            <a:pPr algn="ctr"/>
-            <a:r>
-              <a:rPr lang="fr-FR" sz="800" b="1" smtClean="0"/>
-              <a:t>Politiques</a:t>
-            </a:r>
-          </a:p>
-          <a:p>
-            <a:pPr algn="ctr"/>
-            <a:endParaRPr lang="fr-FR" sz="800" b="1"/>
-          </a:p>
-          <a:p>
-            <a:r>
-              <a:rPr lang="fr-FR" sz="800" b="1" smtClean="0"/>
-              <a:t>Politique</a:t>
-            </a:r>
-          </a:p>
-          <a:p>
-            <a:r>
-              <a:rPr lang="fr-FR" sz="800" smtClean="0"/>
-              <a:t>Expression</a:t>
-            </a:r>
-            <a:endParaRPr lang="fr-FR" sz="800" b="1" dirty="0"/>
-          </a:p>
-        </p:txBody>
-      </p:sp>
-      <p:cxnSp>
-        <p:nvCxnSpPr>
-          <p:cNvPr id="194" name="Connecteur droit 193"/>
-          <p:cNvCxnSpPr>
-            <a:stCxn id="15" idx="3"/>
-            <a:endCxn id="190" idx="1"/>
-          </p:cNvCxnSpPr>
-          <p:nvPr/>
-        </p:nvCxnSpPr>
-        <p:spPr>
-          <a:xfrm flipV="1">
-            <a:off x="3761927" y="2204968"/>
-            <a:ext cx="283784" cy="1277"/>
-          </a:xfrm>
-          <a:prstGeom prst="line">
-            <a:avLst/>
-          </a:prstGeom>
-          <a:ln w="3175" cmpd="sng">
-            <a:solidFill>
-              <a:srgbClr val="000000"/>
-            </a:solidFill>
-            <a:headEnd type="none"/>
-            <a:tailEnd type="triangle"/>
-          </a:ln>
-        </p:spPr>
-        <p:style>
-          <a:lnRef idx="2">
-            <a:schemeClr val="accent1"/>
-          </a:lnRef>
-          <a:fillRef idx="0">
-            <a:schemeClr val="accent1"/>
-          </a:fillRef>
-          <a:effectRef idx="1">
-            <a:schemeClr val="accent1"/>
-          </a:effectRef>
-          <a:fontRef idx="minor">
-            <a:schemeClr val="tx1"/>
-          </a:fontRef>
-        </p:style>
-      </p:cxnSp>
-      <p:sp>
-        <p:nvSpPr>
-          <p:cNvPr id="216" name="ZoneTexte 215"/>
+      <p:sp>
+        <p:nvSpPr>
+          <p:cNvPr id="33" name="ZoneTexte 32"/>
           <p:cNvSpPr txBox="1"/>
           <p:nvPr/>
         </p:nvSpPr>
@@ -4792,7 +4903,7 @@
       </p:sp>
       <p:cxnSp>
         <p:nvCxnSpPr>
-          <p:cNvPr id="217" name="Connecteur droit 216"/>
+          <p:cNvPr id="34" name="Connecteur droit 33"/>
           <p:cNvCxnSpPr/>
           <p:nvPr/>
         </p:nvCxnSpPr>
@@ -4829,7 +4940,7 @@
       </p:cxnSp>
       <p:sp>
         <p:nvSpPr>
-          <p:cNvPr id="218" name="ZoneTexte 217"/>
+          <p:cNvPr id="35" name="ZoneTexte 34"/>
           <p:cNvSpPr txBox="1"/>
           <p:nvPr/>
         </p:nvSpPr>
@@ -4861,23 +4972,23 @@
           <a:p>
             <a:pPr algn="ctr"/>
             <a:r>
-              <a:rPr lang="fr-FR" sz="800" b="1" smtClean="0"/>
+              <a:rPr lang="fr-FR" sz="800" b="1" dirty="0" smtClean="0"/>
               <a:t>Politiques</a:t>
             </a:r>
           </a:p>
           <a:p>
             <a:pPr algn="ctr"/>
-            <a:endParaRPr lang="fr-FR" sz="800" b="1"/>
-          </a:p>
-          <a:p>
-            <a:r>
-              <a:rPr lang="fr-FR" sz="800" b="1" smtClean="0"/>
+            <a:endParaRPr lang="fr-FR" sz="800" b="1" dirty="0"/>
+          </a:p>
+          <a:p>
+            <a:r>
+              <a:rPr lang="fr-FR" sz="800" b="1" dirty="0" smtClean="0"/>
               <a:t>Politique</a:t>
             </a:r>
           </a:p>
           <a:p>
             <a:r>
-              <a:rPr lang="fr-FR" sz="800" smtClean="0"/>
+              <a:rPr lang="fr-FR" sz="800" dirty="0" smtClean="0"/>
               <a:t>Expression</a:t>
             </a:r>
             <a:endParaRPr lang="fr-FR" sz="800" b="1" dirty="0"/>
@@ -4886,7 +4997,7 @@
       </p:sp>
       <p:cxnSp>
         <p:nvCxnSpPr>
-          <p:cNvPr id="219" name="Connecteur droit 218"/>
+          <p:cNvPr id="36" name="Connecteur droit 35"/>
           <p:cNvCxnSpPr/>
           <p:nvPr/>
         </p:nvCxnSpPr>
@@ -4923,7 +5034,7 @@
       </p:cxnSp>
       <p:sp>
         <p:nvSpPr>
-          <p:cNvPr id="229" name="ZoneTexte 228"/>
+          <p:cNvPr id="37" name="ZoneTexte 36"/>
           <p:cNvSpPr txBox="1"/>
           <p:nvPr/>
         </p:nvSpPr>
@@ -4961,31 +5072,33 @@
           </a:p>
           <a:p>
             <a:pPr algn="ctr"/>
-            <a:endParaRPr lang="fr-FR" sz="800" b="1" smtClean="0"/>
-          </a:p>
-          <a:p>
-            <a:r>
-              <a:rPr lang="fr-FR" sz="800" b="1" smtClean="0"/>
+            <a:endParaRPr lang="fr-FR" sz="800" b="1" dirty="0" smtClean="0"/>
+          </a:p>
+          <a:p>
+            <a:r>
+              <a:rPr lang="fr-FR" sz="800" b="1" dirty="0" err="1" smtClean="0"/>
               <a:t>ID_Groupe</a:t>
             </a:r>
-          </a:p>
-          <a:p>
-            <a:r>
-              <a:rPr lang="fr-FR" sz="800" smtClean="0"/>
+            <a:endParaRPr lang="fr-FR" sz="800" b="1" dirty="0" smtClean="0"/>
+          </a:p>
+          <a:p>
+            <a:r>
+              <a:rPr lang="fr-FR" sz="800" dirty="0" smtClean="0"/>
               <a:t>Groupe</a:t>
             </a:r>
           </a:p>
           <a:p>
             <a:r>
-              <a:rPr lang="fr-FR" sz="800" i="1" smtClean="0"/>
+              <a:rPr lang="fr-FR" sz="800" i="1" dirty="0" err="1" smtClean="0"/>
               <a:t>ID_Clé</a:t>
             </a:r>
-          </a:p>
-        </p:txBody>
-      </p:sp>
-      <p:sp>
-        <p:nvSpPr>
-          <p:cNvPr id="230" name="ZoneTexte 229"/>
+            <a:endParaRPr lang="fr-FR" sz="800" i="1" dirty="0" smtClean="0"/>
+          </a:p>
+        </p:txBody>
+      </p:sp>
+      <p:sp>
+        <p:nvSpPr>
+          <p:cNvPr id="38" name="ZoneTexte 37"/>
           <p:cNvSpPr txBox="1"/>
           <p:nvPr/>
         </p:nvSpPr>
@@ -5040,9 +5153,10 @@
           </a:p>
           <a:p>
             <a:r>
-              <a:rPr lang="fr-FR" sz="800" smtClean="0"/>
-              <a:t>Generalise</a:t>
-            </a:r>
+              <a:rPr lang="fr-FR" sz="800" dirty="0" err="1"/>
+              <a:t>Statut_Gen</a:t>
+            </a:r>
+            <a:endParaRPr lang="fr-FR" sz="800" smtClean="0"/>
           </a:p>
           <a:p>
             <a:r>
@@ -5064,7 +5178,7 @@
       </p:sp>
       <p:sp>
         <p:nvSpPr>
-          <p:cNvPr id="231" name="ZoneTexte 230"/>
+          <p:cNvPr id="39" name="ZoneTexte 38"/>
           <p:cNvSpPr txBox="1"/>
           <p:nvPr/>
         </p:nvSpPr>
@@ -5118,9 +5232,10 @@
           </a:p>
           <a:p>
             <a:r>
-              <a:rPr lang="fr-FR" sz="800" smtClean="0"/>
-              <a:t>Generalise</a:t>
-            </a:r>
+              <a:rPr lang="fr-FR" sz="800"/>
+              <a:t>Affect_Gen</a:t>
+            </a:r>
+            <a:endParaRPr lang="fr-FR" sz="800" smtClean="0"/>
           </a:p>
           <a:p>
             <a:r>
@@ -5139,7 +5254,7 @@
       </p:sp>
       <p:sp>
         <p:nvSpPr>
-          <p:cNvPr id="233" name="ZoneTexte 232"/>
+          <p:cNvPr id="40" name="ZoneTexte 39"/>
           <p:cNvSpPr txBox="1"/>
           <p:nvPr/>
         </p:nvSpPr>
@@ -5195,7 +5310,7 @@
           <a:p>
             <a:r>
               <a:rPr lang="fr-FR" sz="800" smtClean="0"/>
-              <a:t>Meta_Chiffree</a:t>
+              <a:t>Meta_Chiffrees</a:t>
             </a:r>
           </a:p>
           <a:p>
@@ -5221,7 +5336,7 @@
       </p:sp>
       <p:sp>
         <p:nvSpPr>
-          <p:cNvPr id="235" name="ZoneTexte 234"/>
+          <p:cNvPr id="41" name="ZoneTexte 40"/>
           <p:cNvSpPr txBox="1"/>
           <p:nvPr/>
         </p:nvSpPr>
@@ -5285,7 +5400,7 @@
       </p:sp>
       <p:sp>
         <p:nvSpPr>
-          <p:cNvPr id="236" name="ZoneTexte 235"/>
+          <p:cNvPr id="42" name="ZoneTexte 41"/>
           <p:cNvSpPr txBox="1"/>
           <p:nvPr/>
         </p:nvSpPr>
@@ -5341,10 +5456,10 @@
       </p:sp>
       <p:cxnSp>
         <p:nvCxnSpPr>
-          <p:cNvPr id="237" name="Connecteur droit 236"/>
+          <p:cNvPr id="43" name="Connecteur droit 42"/>
           <p:cNvCxnSpPr>
-            <a:stCxn id="236" idx="0"/>
-            <a:endCxn id="233" idx="2"/>
+            <a:stCxn id="42" idx="0"/>
+            <a:endCxn id="40" idx="2"/>
           </p:cNvCxnSpPr>
           <p:nvPr/>
         </p:nvCxnSpPr>
@@ -5381,10 +5496,10 @@
       </p:cxnSp>
       <p:cxnSp>
         <p:nvCxnSpPr>
-          <p:cNvPr id="240" name="Connecteur droit 239"/>
+          <p:cNvPr id="44" name="Connecteur droit 43"/>
           <p:cNvCxnSpPr>
-            <a:stCxn id="236" idx="2"/>
-            <a:endCxn id="235" idx="0"/>
+            <a:stCxn id="42" idx="2"/>
+            <a:endCxn id="41" idx="0"/>
           </p:cNvCxnSpPr>
           <p:nvPr/>
         </p:nvCxnSpPr>
@@ -5421,13 +5536,13 @@
       </p:cxnSp>
       <p:cxnSp>
         <p:nvCxnSpPr>
-          <p:cNvPr id="244" name="Connecteur droit 243"/>
+          <p:cNvPr id="45" name="Connecteur droit 44"/>
           <p:cNvCxnSpPr/>
           <p:nvPr/>
         </p:nvCxnSpPr>
         <p:spPr>
           <a:xfrm>
-            <a:off x="0" y="3734748"/>
+            <a:off x="0" y="3861748"/>
             <a:ext cx="9144000" cy="0"/>
           </a:xfrm>
           <a:prstGeom prst="line">
@@ -5451,7 +5566,7 @@
       </p:cxnSp>
       <p:cxnSp>
         <p:nvCxnSpPr>
-          <p:cNvPr id="245" name="Connecteur droit 244"/>
+          <p:cNvPr id="46" name="Connecteur droit 45"/>
           <p:cNvCxnSpPr/>
           <p:nvPr/>
         </p:nvCxnSpPr>
@@ -5481,14 +5596,14 @@
       </p:cxnSp>
       <p:sp>
         <p:nvSpPr>
-          <p:cNvPr id="272" name="ZoneTexte 271"/>
+          <p:cNvPr id="47" name="ZoneTexte 46"/>
           <p:cNvSpPr txBox="1"/>
           <p:nvPr/>
         </p:nvSpPr>
         <p:spPr>
           <a:xfrm>
-            <a:off x="2285956" y="4978516"/>
-            <a:ext cx="708888" cy="607814"/>
+            <a:off x="2264309" y="4988504"/>
+            <a:ext cx="765921" cy="1200629"/>
           </a:xfrm>
           <a:prstGeom prst="rect">
             <a:avLst/>
@@ -5513,37 +5628,76 @@
           <a:p>
             <a:pPr algn="ctr"/>
             <a:r>
-              <a:rPr lang="fr-FR" sz="800" b="1" smtClean="0"/>
+              <a:rPr lang="fr-FR" sz="800" b="1" dirty="0" smtClean="0"/>
               <a:t>Utilisateurs (1) </a:t>
             </a:r>
           </a:p>
           <a:p>
             <a:pPr algn="ctr"/>
-            <a:endParaRPr lang="fr-FR" sz="800" b="1"/>
-          </a:p>
-          <a:p>
-            <a:r>
-              <a:rPr lang="fr-FR" sz="800" b="1" smtClean="0"/>
+            <a:endParaRPr lang="fr-FR" sz="800" b="1" dirty="0"/>
+          </a:p>
+          <a:p>
+            <a:r>
+              <a:rPr lang="fr-FR" sz="800" b="1" dirty="0" smtClean="0"/>
               <a:t>Login</a:t>
             </a:r>
           </a:p>
           <a:p>
             <a:r>
-              <a:rPr lang="fr-FR" sz="800" smtClean="0"/>
-              <a:t>H(Password)</a:t>
-            </a:r>
-          </a:p>
-        </p:txBody>
-      </p:sp>
-      <p:sp>
-        <p:nvSpPr>
-          <p:cNvPr id="274" name="ZoneTexte 273"/>
+              <a:rPr lang="fr-FR" sz="800" dirty="0" smtClean="0"/>
+              <a:t>H(</a:t>
+            </a:r>
+            <a:r>
+              <a:rPr lang="fr-FR" sz="800" dirty="0" err="1" smtClean="0"/>
+              <a:t>Password</a:t>
+            </a:r>
+            <a:r>
+              <a:rPr lang="fr-FR" sz="800" dirty="0" smtClean="0"/>
+              <a:t>)</a:t>
+            </a:r>
+          </a:p>
+          <a:p>
+            <a:r>
+              <a:rPr lang="fr-FR" sz="800" noProof="1"/>
+              <a:t>IP</a:t>
+            </a:r>
+          </a:p>
+          <a:p>
+            <a:r>
+              <a:rPr lang="fr-FR" sz="800" noProof="1"/>
+              <a:t>Port</a:t>
+            </a:r>
+          </a:p>
+          <a:p>
+            <a:r>
+              <a:rPr lang="fr-FR" sz="800" i="1" noProof="1"/>
+              <a:t>ID_Statut</a:t>
+            </a:r>
+          </a:p>
+          <a:p>
+            <a:r>
+              <a:rPr lang="fr-FR" sz="800" i="1" noProof="1"/>
+              <a:t>ID_Affectation</a:t>
+            </a:r>
+          </a:p>
+          <a:p>
+            <a:r>
+              <a:rPr lang="fr-FR" sz="800" i="1" noProof="1"/>
+              <a:t>Frontale</a:t>
+            </a:r>
+            <a:endParaRPr lang="fr-FR" sz="800" dirty="0" smtClean="0"/>
+          </a:p>
+        </p:txBody>
+      </p:sp>
+      <p:sp>
+        <p:nvSpPr>
+          <p:cNvPr id="48" name="ZoneTexte 47"/>
           <p:cNvSpPr txBox="1"/>
           <p:nvPr/>
         </p:nvSpPr>
         <p:spPr>
           <a:xfrm>
-            <a:off x="3188948" y="5872528"/>
+            <a:off x="3188948" y="5741908"/>
             <a:ext cx="686576" cy="563642"/>
           </a:xfrm>
           <a:prstGeom prst="rect">
@@ -5598,7 +5752,7 @@
       </p:sp>
       <p:sp>
         <p:nvSpPr>
-          <p:cNvPr id="282" name="ZoneTexte 281"/>
+          <p:cNvPr id="49" name="ZoneTexte 48"/>
           <p:cNvSpPr txBox="1"/>
           <p:nvPr/>
         </p:nvSpPr>
@@ -5668,7 +5822,7 @@
       </p:sp>
       <p:sp>
         <p:nvSpPr>
-          <p:cNvPr id="284" name="ZoneTexte 283"/>
+          <p:cNvPr id="50" name="ZoneTexte 49"/>
           <p:cNvSpPr txBox="1"/>
           <p:nvPr/>
         </p:nvSpPr>
@@ -5724,13 +5878,13 @@
       </p:sp>
       <p:sp>
         <p:nvSpPr>
-          <p:cNvPr id="285" name="ZoneTexte 284"/>
+          <p:cNvPr id="51" name="ZoneTexte 50"/>
           <p:cNvSpPr txBox="1"/>
           <p:nvPr/>
         </p:nvSpPr>
         <p:spPr>
           <a:xfrm>
-            <a:off x="4045710" y="1062314"/>
+            <a:off x="4283555" y="1062314"/>
             <a:ext cx="787547" cy="563642"/>
           </a:xfrm>
           <a:prstGeom prst="rect">
@@ -5751,14 +5905,14 @@
           <a:p>
             <a:pPr algn="ctr"/>
             <a:r>
-              <a:rPr lang="fr-FR" sz="800" b="1" smtClean="0"/>
+              <a:rPr lang="fr-FR" sz="800" smtClean="0"/>
               <a:t>Server</a:t>
             </a:r>
-            <a:endParaRPr lang="fr-FR" sz="800" b="1" dirty="0" smtClean="0"/>
-          </a:p>
-          <a:p>
-            <a:pPr algn="ctr"/>
-            <a:endParaRPr lang="fr-FR" sz="800" b="1" smtClean="0"/>
+            <a:endParaRPr lang="fr-FR" sz="800" dirty="0" smtClean="0"/>
+          </a:p>
+          <a:p>
+            <a:pPr algn="ctr"/>
+            <a:endParaRPr lang="fr-FR" sz="800" smtClean="0"/>
           </a:p>
           <a:p>
             <a:r>
@@ -5774,13 +5928,13 @@
           </a:p>
           <a:p>
             <a:pPr algn="ctr"/>
-            <a:endParaRPr lang="fr-FR" sz="800" b="1" dirty="0"/>
-          </a:p>
-        </p:txBody>
-      </p:sp>
-      <p:sp>
-        <p:nvSpPr>
-          <p:cNvPr id="286" name="ZoneTexte 285"/>
+            <a:endParaRPr lang="fr-FR" sz="800" dirty="0"/>
+          </a:p>
+        </p:txBody>
+      </p:sp>
+      <p:sp>
+        <p:nvSpPr>
+          <p:cNvPr id="52" name="ZoneTexte 51"/>
           <p:cNvSpPr txBox="1"/>
           <p:nvPr/>
         </p:nvSpPr>
@@ -5839,14 +5993,14 @@
       </p:sp>
       <p:sp>
         <p:nvSpPr>
-          <p:cNvPr id="297" name="ZoneTexte 296"/>
+          <p:cNvPr id="53" name="ZoneTexte 52"/>
           <p:cNvSpPr txBox="1"/>
           <p:nvPr/>
         </p:nvSpPr>
         <p:spPr>
           <a:xfrm>
-            <a:off x="5902991" y="4115451"/>
-            <a:ext cx="880709" cy="684072"/>
+            <a:off x="5902991" y="4115450"/>
+            <a:ext cx="880709" cy="799751"/>
           </a:xfrm>
           <a:prstGeom prst="rect">
             <a:avLst/>
@@ -5882,6 +6036,13 @@
           </a:p>
           <a:p>
             <a:r>
+              <a:rPr lang="fr-FR" sz="800"/>
+              <a:t>Famille</a:t>
+            </a:r>
+            <a:endParaRPr lang="fr-FR" sz="800" smtClean="0"/>
+          </a:p>
+          <a:p>
+            <a:r>
               <a:rPr lang="fr-FR" sz="800" smtClean="0"/>
               <a:t>IP</a:t>
             </a:r>
@@ -5889,7 +6050,7 @@
           <a:p>
             <a:r>
               <a:rPr lang="fr-FR" sz="800" smtClean="0"/>
-              <a:t>Port</a:t>
+              <a:t>externalPort</a:t>
             </a:r>
           </a:p>
           <a:p>
@@ -5900,7 +6061,7 @@
       </p:sp>
       <p:sp>
         <p:nvSpPr>
-          <p:cNvPr id="307" name="Rectangle 306"/>
+          <p:cNvPr id="54" name="Rectangle 53"/>
           <p:cNvSpPr/>
           <p:nvPr/>
         </p:nvSpPr>
@@ -5920,20 +6081,20 @@
           <a:lstStyle/>
           <a:p>
             <a:r>
-              <a:rPr lang="fr-FR" sz="1050" b="1" smtClean="0">
+              <a:rPr lang="fr-FR" sz="1050" b="1" dirty="0" smtClean="0">
                 <a:solidFill>
                   <a:prstClr val="black"/>
                 </a:solidFill>
               </a:rPr>
               <a:t>BD d’initialisation</a:t>
             </a:r>
-            <a:endParaRPr lang="fr-FR" sz="2800"/>
-          </a:p>
-        </p:txBody>
-      </p:sp>
-      <p:sp>
-        <p:nvSpPr>
-          <p:cNvPr id="308" name="Rectangle 307"/>
+            <a:endParaRPr lang="fr-FR" sz="2800" dirty="0"/>
+          </a:p>
+        </p:txBody>
+      </p:sp>
+      <p:sp>
+        <p:nvSpPr>
+          <p:cNvPr id="55" name="Rectangle 54"/>
           <p:cNvSpPr/>
           <p:nvPr/>
         </p:nvSpPr>
@@ -5966,7 +6127,7 @@
       </p:sp>
       <p:sp>
         <p:nvSpPr>
-          <p:cNvPr id="309" name="Rectangle 308"/>
+          <p:cNvPr id="56" name="Rectangle 55"/>
           <p:cNvSpPr/>
           <p:nvPr/>
         </p:nvSpPr>
@@ -5999,7 +6160,7 @@
       </p:sp>
       <p:sp>
         <p:nvSpPr>
-          <p:cNvPr id="310" name="Rectangle 309"/>
+          <p:cNvPr id="57" name="Rectangle 56"/>
           <p:cNvSpPr/>
           <p:nvPr/>
         </p:nvSpPr>
@@ -6032,171 +6193,7 @@
       </p:sp>
       <p:sp>
         <p:nvSpPr>
-          <p:cNvPr id="313" name="ZoneTexte 312"/>
-          <p:cNvSpPr txBox="1"/>
-          <p:nvPr/>
-        </p:nvSpPr>
-        <p:spPr>
-          <a:xfrm>
-            <a:off x="5894421" y="5302940"/>
-            <a:ext cx="897849" cy="1114791"/>
-          </a:xfrm>
-          <a:prstGeom prst="rect">
-            <a:avLst/>
-          </a:prstGeom>
-          <a:solidFill>
-            <a:schemeClr val="tx2">
-              <a:lumMod val="20000"/>
-              <a:lumOff val="80000"/>
-            </a:schemeClr>
-          </a:solidFill>
-          <a:ln>
-            <a:solidFill>
-              <a:schemeClr val="tx1"/>
-            </a:solidFill>
-          </a:ln>
-        </p:spPr>
-        <p:txBody>
-          <a:bodyPr wrap="square" lIns="36000" tIns="36000" rIns="36000" bIns="36000" rtlCol="0">
-            <a:noAutofit/>
-          </a:bodyPr>
-          <a:lstStyle/>
-          <a:p>
-            <a:pPr algn="ctr"/>
-            <a:r>
-              <a:rPr lang="fr-FR" sz="800" b="1" smtClean="0"/>
-              <a:t>LogCOM</a:t>
-            </a:r>
-            <a:endParaRPr lang="fr-FR" sz="800" b="1" dirty="0" smtClean="0"/>
-          </a:p>
-          <a:p>
-            <a:pPr algn="ctr"/>
-            <a:endParaRPr lang="fr-FR" sz="800" b="1" smtClean="0"/>
-          </a:p>
-          <a:p>
-            <a:r>
-              <a:rPr lang="fr-FR" sz="800" b="1" smtClean="0"/>
-              <a:t>Date</a:t>
-            </a:r>
-          </a:p>
-          <a:p>
-            <a:r>
-              <a:rPr lang="fr-FR" sz="800" b="1" smtClean="0"/>
-              <a:t>IP_Emetteur</a:t>
-            </a:r>
-          </a:p>
-          <a:p>
-            <a:r>
-              <a:rPr lang="fr-FR" sz="800" b="1" smtClean="0"/>
-              <a:t>Port_Emetteur</a:t>
-            </a:r>
-          </a:p>
-          <a:p>
-            <a:r>
-              <a:rPr lang="fr-FR" sz="800" b="1" smtClean="0"/>
-              <a:t>IP_Recepteur</a:t>
-            </a:r>
-          </a:p>
-          <a:p>
-            <a:r>
-              <a:rPr lang="fr-FR" sz="800" b="1" smtClean="0"/>
-              <a:t>Port_Recepteur</a:t>
-            </a:r>
-          </a:p>
-          <a:p>
-            <a:r>
-              <a:rPr lang="fr-FR" sz="800" b="1" smtClean="0"/>
-              <a:t>MSG</a:t>
-            </a:r>
-            <a:endParaRPr lang="fr-FR" sz="800" b="1" dirty="0"/>
-          </a:p>
-        </p:txBody>
-      </p:sp>
-      <p:sp>
-        <p:nvSpPr>
-          <p:cNvPr id="384" name="ZoneTexte 383"/>
-          <p:cNvSpPr txBox="1"/>
-          <p:nvPr/>
-        </p:nvSpPr>
-        <p:spPr>
-          <a:xfrm>
-            <a:off x="5902991" y="2121635"/>
-            <a:ext cx="854062" cy="1114791"/>
-          </a:xfrm>
-          <a:prstGeom prst="rect">
-            <a:avLst/>
-          </a:prstGeom>
-          <a:solidFill>
-            <a:schemeClr val="tx2">
-              <a:lumMod val="20000"/>
-              <a:lumOff val="80000"/>
-            </a:schemeClr>
-          </a:solidFill>
-          <a:ln>
-            <a:solidFill>
-              <a:schemeClr val="tx1"/>
-            </a:solidFill>
-          </a:ln>
-        </p:spPr>
-        <p:txBody>
-          <a:bodyPr wrap="square" lIns="36000" tIns="36000" rIns="36000" bIns="36000" rtlCol="0">
-            <a:noAutofit/>
-          </a:bodyPr>
-          <a:lstStyle/>
-          <a:p>
-            <a:pPr algn="ctr"/>
-            <a:r>
-              <a:rPr lang="fr-FR" sz="800" b="1" smtClean="0"/>
-              <a:t>LogCOM</a:t>
-            </a:r>
-            <a:endParaRPr lang="fr-FR" sz="800" b="1" dirty="0" smtClean="0"/>
-          </a:p>
-          <a:p>
-            <a:pPr algn="ctr"/>
-            <a:endParaRPr lang="fr-FR" sz="800" b="1" smtClean="0"/>
-          </a:p>
-          <a:p>
-            <a:r>
-              <a:rPr lang="fr-FR" sz="800" b="1" smtClean="0"/>
-              <a:t>Date</a:t>
-            </a:r>
-          </a:p>
-          <a:p>
-            <a:r>
-              <a:rPr lang="fr-FR" sz="800" b="1" smtClean="0"/>
-              <a:t>IP_Emetteur</a:t>
-            </a:r>
-          </a:p>
-          <a:p>
-            <a:r>
-              <a:rPr lang="fr-FR" sz="800" b="1" smtClean="0"/>
-              <a:t>Port_Emetteur</a:t>
-            </a:r>
-          </a:p>
-          <a:p>
-            <a:r>
-              <a:rPr lang="fr-FR" sz="800" b="1" smtClean="0"/>
-              <a:t>IP_Recepteur</a:t>
-            </a:r>
-          </a:p>
-          <a:p>
-            <a:r>
-              <a:rPr lang="fr-FR" sz="800" b="1" smtClean="0"/>
-              <a:t>Port_Recepteur</a:t>
-            </a:r>
-          </a:p>
-          <a:p>
-            <a:r>
-              <a:rPr lang="fr-FR" sz="800" b="1" smtClean="0"/>
-              <a:t>MSG</a:t>
-            </a:r>
-            <a:endParaRPr lang="fr-FR" sz="800" b="1" dirty="0"/>
-          </a:p>
-        </p:txBody>
-      </p:sp>
-      <p:sp>
-        <p:nvSpPr>
-          <p:cNvPr id="428" name="Rectangle 427"/>
+          <p:cNvPr id="58" name="Rectangle 57"/>
           <p:cNvSpPr/>
           <p:nvPr/>
         </p:nvSpPr>
@@ -6229,14 +6226,14 @@
       </p:sp>
       <p:cxnSp>
         <p:nvCxnSpPr>
-          <p:cNvPr id="429" name="Connecteur droit 428"/>
+          <p:cNvPr id="59" name="Connecteur droit 58"/>
           <p:cNvCxnSpPr/>
           <p:nvPr/>
         </p:nvCxnSpPr>
         <p:spPr>
           <a:xfrm flipV="1">
-            <a:off x="7198215" y="3734748"/>
-            <a:ext cx="0" cy="3118283"/>
+            <a:off x="7198215" y="3861748"/>
+            <a:ext cx="0" cy="2991284"/>
           </a:xfrm>
           <a:prstGeom prst="line">
             <a:avLst/>
@@ -6259,7 +6256,7 @@
       </p:cxnSp>
       <p:sp>
         <p:nvSpPr>
-          <p:cNvPr id="432" name="ZoneTexte 431"/>
+          <p:cNvPr id="60" name="ZoneTexte 59"/>
           <p:cNvSpPr txBox="1"/>
           <p:nvPr/>
         </p:nvSpPr>
@@ -6318,89 +6315,7 @@
       </p:sp>
       <p:sp>
         <p:nvSpPr>
-          <p:cNvPr id="433" name="ZoneTexte 432"/>
-          <p:cNvSpPr txBox="1"/>
-          <p:nvPr/>
-        </p:nvSpPr>
-        <p:spPr>
-          <a:xfrm>
-            <a:off x="7704695" y="5321379"/>
-            <a:ext cx="897849" cy="1114791"/>
-          </a:xfrm>
-          <a:prstGeom prst="rect">
-            <a:avLst/>
-          </a:prstGeom>
-          <a:solidFill>
-            <a:schemeClr val="tx2">
-              <a:lumMod val="20000"/>
-              <a:lumOff val="80000"/>
-            </a:schemeClr>
-          </a:solidFill>
-          <a:ln>
-            <a:solidFill>
-              <a:schemeClr val="tx1"/>
-            </a:solidFill>
-          </a:ln>
-        </p:spPr>
-        <p:txBody>
-          <a:bodyPr wrap="square" lIns="36000" tIns="36000" rIns="36000" bIns="36000" rtlCol="0">
-            <a:noAutofit/>
-          </a:bodyPr>
-          <a:lstStyle/>
-          <a:p>
-            <a:pPr algn="ctr"/>
-            <a:r>
-              <a:rPr lang="fr-FR" sz="800" b="1" smtClean="0"/>
-              <a:t>LogCOM</a:t>
-            </a:r>
-            <a:endParaRPr lang="fr-FR" sz="800" b="1" dirty="0" smtClean="0"/>
-          </a:p>
-          <a:p>
-            <a:pPr algn="ctr"/>
-            <a:endParaRPr lang="fr-FR" sz="800" b="1" smtClean="0"/>
-          </a:p>
-          <a:p>
-            <a:r>
-              <a:rPr lang="fr-FR" sz="800" b="1" smtClean="0"/>
-              <a:t>Date</a:t>
-            </a:r>
-          </a:p>
-          <a:p>
-            <a:r>
-              <a:rPr lang="fr-FR" sz="800" b="1" smtClean="0"/>
-              <a:t>IP_Emetteur</a:t>
-            </a:r>
-          </a:p>
-          <a:p>
-            <a:r>
-              <a:rPr lang="fr-FR" sz="800" b="1" smtClean="0"/>
-              <a:t>Port_Emetteur</a:t>
-            </a:r>
-          </a:p>
-          <a:p>
-            <a:r>
-              <a:rPr lang="fr-FR" sz="800" b="1" smtClean="0"/>
-              <a:t>IP_Recepteur</a:t>
-            </a:r>
-          </a:p>
-          <a:p>
-            <a:r>
-              <a:rPr lang="fr-FR" sz="800" b="1" smtClean="0"/>
-              <a:t>Port_Recepteur</a:t>
-            </a:r>
-          </a:p>
-          <a:p>
-            <a:r>
-              <a:rPr lang="fr-FR" sz="800" b="1" smtClean="0"/>
-              <a:t>MSG</a:t>
-            </a:r>
-            <a:endParaRPr lang="fr-FR" sz="800" b="1" dirty="0"/>
-          </a:p>
-        </p:txBody>
-      </p:sp>
-      <p:sp>
-        <p:nvSpPr>
-          <p:cNvPr id="434" name="ZoneTexte 433"/>
+          <p:cNvPr id="61" name="ZoneTexte 60"/>
           <p:cNvSpPr txBox="1"/>
           <p:nvPr/>
         </p:nvSpPr>
@@ -6432,35 +6347,41 @@
           <a:p>
             <a:pPr algn="ctr"/>
             <a:r>
-              <a:rPr lang="fr-FR" sz="800" b="1" smtClean="0"/>
+              <a:rPr lang="fr-FR" sz="800" b="1" dirty="0" err="1" smtClean="0"/>
               <a:t>Cles</a:t>
             </a:r>
             <a:endParaRPr lang="fr-FR" sz="800" b="1" dirty="0" smtClean="0"/>
           </a:p>
           <a:p>
             <a:pPr algn="ctr"/>
-            <a:endParaRPr lang="fr-FR" sz="800" b="1" smtClean="0"/>
-          </a:p>
-          <a:p>
-            <a:r>
-              <a:rPr lang="fr-FR" sz="800" b="1" smtClean="0"/>
+            <a:endParaRPr lang="fr-FR" sz="800" b="1" dirty="0" smtClean="0"/>
+          </a:p>
+          <a:p>
+            <a:r>
+              <a:rPr lang="fr-FR" sz="800" b="1" dirty="0" err="1" smtClean="0"/>
               <a:t>ID_Clé</a:t>
             </a:r>
-          </a:p>
-          <a:p>
-            <a:r>
-              <a:rPr lang="fr-FR" sz="800" smtClean="0"/>
+            <a:endParaRPr lang="fr-FR" sz="800" b="1" dirty="0" smtClean="0"/>
+          </a:p>
+          <a:p>
+            <a:r>
+              <a:rPr lang="fr-FR" sz="800" dirty="0" err="1" smtClean="0"/>
               <a:t>Kpub</a:t>
             </a:r>
-          </a:p>
-          <a:p>
-            <a:r>
-              <a:rPr lang="fr-FR" sz="800" smtClean="0"/>
-              <a:t>Kpriv (Les miens)</a:t>
-            </a:r>
-          </a:p>
-          <a:p>
-            <a:endParaRPr lang="fr-FR" sz="800" smtClean="0"/>
+            <a:endParaRPr lang="fr-FR" sz="800" dirty="0" smtClean="0"/>
+          </a:p>
+          <a:p>
+            <a:r>
+              <a:rPr lang="fr-FR" sz="800" dirty="0" err="1" smtClean="0"/>
+              <a:t>Kpriv</a:t>
+            </a:r>
+            <a:r>
+              <a:rPr lang="fr-FR" sz="800" dirty="0" smtClean="0"/>
+              <a:t> (Les miens)</a:t>
+            </a:r>
+          </a:p>
+          <a:p>
+            <a:endParaRPr lang="fr-FR" sz="800" dirty="0" smtClean="0"/>
           </a:p>
           <a:p>
             <a:pPr algn="ctr"/>
@@ -6470,7 +6391,7 @@
       </p:sp>
       <p:cxnSp>
         <p:nvCxnSpPr>
-          <p:cNvPr id="435" name="Connecteur droit 434"/>
+          <p:cNvPr id="62" name="Connecteur droit 61"/>
           <p:cNvCxnSpPr/>
           <p:nvPr/>
         </p:nvCxnSpPr>
@@ -6507,10 +6428,10 @@
       </p:cxnSp>
       <p:cxnSp>
         <p:nvCxnSpPr>
-          <p:cNvPr id="441" name="Connecteur droit 440"/>
+          <p:cNvPr id="63" name="Connecteur droit 62"/>
           <p:cNvCxnSpPr>
-            <a:stCxn id="231" idx="0"/>
-            <a:endCxn id="434" idx="2"/>
+            <a:stCxn id="39" idx="0"/>
+            <a:endCxn id="61" idx="2"/>
           </p:cNvCxnSpPr>
           <p:nvPr/>
         </p:nvCxnSpPr>
@@ -6547,10 +6468,10 @@
       </p:cxnSp>
       <p:cxnSp>
         <p:nvCxnSpPr>
-          <p:cNvPr id="449" name="Connecteur droit 448"/>
+          <p:cNvPr id="64" name="Connecteur droit 63"/>
           <p:cNvCxnSpPr>
-            <a:stCxn id="229" idx="1"/>
-            <a:endCxn id="434" idx="3"/>
+            <a:stCxn id="37" idx="1"/>
+            <a:endCxn id="61" idx="3"/>
           </p:cNvCxnSpPr>
           <p:nvPr/>
         </p:nvCxnSpPr>
@@ -6587,14 +6508,14 @@
       </p:cxnSp>
       <p:sp>
         <p:nvSpPr>
-          <p:cNvPr id="470" name="ZoneTexte 469"/>
+          <p:cNvPr id="65" name="ZoneTexte 64"/>
           <p:cNvSpPr txBox="1"/>
           <p:nvPr/>
         </p:nvSpPr>
         <p:spPr>
           <a:xfrm>
             <a:off x="169426" y="1959170"/>
-            <a:ext cx="430190" cy="480762"/>
+            <a:ext cx="430190" cy="699182"/>
           </a:xfrm>
           <a:prstGeom prst="rect">
             <a:avLst/>
@@ -6614,21 +6535,67 @@
           <a:p>
             <a:pPr algn="ctr"/>
             <a:r>
-              <a:rPr lang="fr-FR" sz="800" b="1" smtClean="0"/>
-              <a:t>Clés</a:t>
-            </a:r>
+              <a:rPr lang="fr-FR" sz="800" b="1" dirty="0" err="1" smtClean="0">
+                <a:solidFill>
+                  <a:srgbClr val="FF0000"/>
+                </a:solidFill>
+              </a:rPr>
+              <a:t>Cles</a:t>
+            </a:r>
+            <a:endParaRPr lang="fr-FR" sz="800" b="1" dirty="0" smtClean="0">
+              <a:solidFill>
+                <a:srgbClr val="FF0000"/>
+              </a:solidFill>
+            </a:endParaRPr>
+          </a:p>
+          <a:p>
+            <a:pPr algn="ctr"/>
             <a:endParaRPr lang="fr-FR" sz="800" b="1" dirty="0" smtClean="0"/>
           </a:p>
           <a:p>
-            <a:pPr algn="ctr"/>
-            <a:endParaRPr lang="fr-FR" sz="800" b="1" smtClean="0"/>
-          </a:p>
-          <a:p>
-            <a:r>
-              <a:rPr lang="fr-FR" sz="800" b="1" smtClean="0"/>
-              <a:t>ID_Clé</a:t>
-            </a:r>
-            <a:endParaRPr lang="fr-FR" sz="800" smtClean="0"/>
+            <a:r>
+              <a:rPr lang="fr-FR" sz="800" b="1" dirty="0" err="1" smtClean="0">
+                <a:solidFill>
+                  <a:srgbClr val="FF0000"/>
+                </a:solidFill>
+              </a:rPr>
+              <a:t>ID_Cle</a:t>
+            </a:r>
+            <a:endParaRPr lang="fr-FR" sz="800" b="1" dirty="0" smtClean="0">
+              <a:solidFill>
+                <a:srgbClr val="FF0000"/>
+              </a:solidFill>
+            </a:endParaRPr>
+          </a:p>
+          <a:p>
+            <a:r>
+              <a:rPr lang="fr-FR" sz="800" i="1" dirty="0" err="1" smtClean="0">
+                <a:solidFill>
+                  <a:srgbClr val="FF0000"/>
+                </a:solidFill>
+              </a:rPr>
+              <a:t>Kpub</a:t>
+            </a:r>
+            <a:endParaRPr lang="fr-FR" sz="800" i="1" dirty="0" smtClean="0">
+              <a:solidFill>
+                <a:srgbClr val="FF0000"/>
+              </a:solidFill>
+            </a:endParaRPr>
+          </a:p>
+          <a:p>
+            <a:r>
+              <a:rPr lang="fr-FR" sz="800" i="1" dirty="0" err="1" smtClean="0">
+                <a:solidFill>
+                  <a:srgbClr val="FF0000"/>
+                </a:solidFill>
+              </a:rPr>
+              <a:t>Kpriv</a:t>
+            </a:r>
+            <a:endParaRPr lang="fr-FR" sz="800" i="1" dirty="0" smtClean="0">
+              <a:solidFill>
+                <a:srgbClr val="FF0000"/>
+              </a:solidFill>
+            </a:endParaRPr>
           </a:p>
           <a:p>
             <a:pPr algn="ctr"/>
@@ -6638,17 +6605,17 @@
       </p:sp>
       <p:cxnSp>
         <p:nvCxnSpPr>
-          <p:cNvPr id="475" name="Connecteur droit 30"/>
+          <p:cNvPr id="66" name="Connecteur droit 30"/>
           <p:cNvCxnSpPr>
-            <a:stCxn id="5" idx="1"/>
-            <a:endCxn id="470" idx="3"/>
+            <a:stCxn id="3" idx="1"/>
+            <a:endCxn id="65" idx="3"/>
           </p:cNvCxnSpPr>
           <p:nvPr/>
         </p:nvCxnSpPr>
         <p:spPr>
           <a:xfrm flipH="1">
             <a:off x="599616" y="1331723"/>
-            <a:ext cx="406973" cy="867828"/>
+            <a:ext cx="406973" cy="977038"/>
           </a:xfrm>
           <a:prstGeom prst="straightConnector1">
             <a:avLst/>
@@ -6678,17 +6645,17 @@
       </p:cxnSp>
       <p:cxnSp>
         <p:nvCxnSpPr>
-          <p:cNvPr id="478" name="Connecteur droit 30"/>
+          <p:cNvPr id="67" name="Connecteur droit 30"/>
           <p:cNvCxnSpPr>
-            <a:stCxn id="6" idx="1"/>
-            <a:endCxn id="470" idx="3"/>
+            <a:stCxn id="4" idx="1"/>
+            <a:endCxn id="65" idx="3"/>
           </p:cNvCxnSpPr>
           <p:nvPr/>
         </p:nvCxnSpPr>
         <p:spPr>
           <a:xfrm flipH="1">
             <a:off x="599616" y="2197551"/>
-            <a:ext cx="406974" cy="2000"/>
+            <a:ext cx="406974" cy="111210"/>
           </a:xfrm>
           <a:prstGeom prst="straightConnector1">
             <a:avLst/>
@@ -6718,17 +6685,17 @@
       </p:cxnSp>
       <p:cxnSp>
         <p:nvCxnSpPr>
-          <p:cNvPr id="481" name="Connecteur droit 30"/>
+          <p:cNvPr id="68" name="Connecteur droit 30"/>
           <p:cNvCxnSpPr>
-            <a:stCxn id="9" idx="1"/>
-            <a:endCxn id="470" idx="3"/>
+            <a:stCxn id="7" idx="1"/>
+            <a:endCxn id="65" idx="3"/>
           </p:cNvCxnSpPr>
           <p:nvPr/>
         </p:nvCxnSpPr>
         <p:spPr>
           <a:xfrm flipH="1" flipV="1">
-            <a:off x="599616" y="2199551"/>
-            <a:ext cx="406974" cy="861077"/>
+            <a:off x="599616" y="2308761"/>
+            <a:ext cx="406974" cy="751867"/>
           </a:xfrm>
           <a:prstGeom prst="straightConnector1">
             <a:avLst/>
@@ -6758,7 +6725,7 @@
       </p:cxnSp>
       <p:sp>
         <p:nvSpPr>
-          <p:cNvPr id="74" name="ZoneTexte 73"/>
+          <p:cNvPr id="69" name="ZoneTexte 68"/>
           <p:cNvSpPr txBox="1"/>
           <p:nvPr/>
         </p:nvSpPr>
@@ -6819,7 +6786,7 @@
       </p:sp>
       <p:sp>
         <p:nvSpPr>
-          <p:cNvPr id="75" name="ZoneTexte 74"/>
+          <p:cNvPr id="70" name="ZoneTexte 69"/>
           <p:cNvSpPr txBox="1"/>
           <p:nvPr/>
         </p:nvSpPr>
@@ -6878,16 +6845,291 @@
           </a:p>
         </p:txBody>
       </p:sp>
+      <p:sp>
+        <p:nvSpPr>
+          <p:cNvPr id="91" name="ZoneTexte 90"/>
+          <p:cNvSpPr txBox="1"/>
+          <p:nvPr/>
+        </p:nvSpPr>
+        <p:spPr>
+          <a:xfrm>
+            <a:off x="1" y="671219"/>
+            <a:ext cx="931466" cy="563642"/>
+          </a:xfrm>
+          <a:prstGeom prst="rect">
+            <a:avLst/>
+          </a:prstGeom>
+          <a:noFill/>
+          <a:ln>
+            <a:solidFill>
+              <a:schemeClr val="tx1"/>
+            </a:solidFill>
+          </a:ln>
+        </p:spPr>
+        <p:txBody>
+          <a:bodyPr wrap="square" lIns="36000" tIns="36000" rIns="36000" bIns="36000" rtlCol="0">
+            <a:noAutofit/>
+          </a:bodyPr>
+          <a:lstStyle/>
+          <a:p>
+            <a:pPr algn="ctr"/>
+            <a:r>
+              <a:rPr lang="fr-FR" sz="800" b="1" dirty="0" err="1" smtClean="0"/>
+              <a:t>Predecesseurs_Cle</a:t>
+            </a:r>
+            <a:endParaRPr lang="fr-FR" sz="800" b="1" dirty="0" smtClean="0"/>
+          </a:p>
+          <a:p>
+            <a:pPr algn="ctr"/>
+            <a:endParaRPr lang="fr-FR" sz="800" b="1" dirty="0" smtClean="0"/>
+          </a:p>
+          <a:p>
+            <a:r>
+              <a:rPr lang="fr-FR" sz="800" dirty="0" err="1" smtClean="0"/>
+              <a:t>ID_Cle</a:t>
+            </a:r>
+            <a:endParaRPr lang="fr-FR" sz="800" dirty="0" smtClean="0"/>
+          </a:p>
+          <a:p>
+            <a:r>
+              <a:rPr lang="fr-FR" sz="800" dirty="0" err="1" smtClean="0"/>
+              <a:t>ID_Parent</a:t>
+            </a:r>
+            <a:endParaRPr lang="fr-FR" sz="800" dirty="0" smtClean="0"/>
+          </a:p>
+          <a:p>
+            <a:pPr algn="ctr"/>
+            <a:endParaRPr lang="fr-FR" sz="800" b="1" dirty="0"/>
+          </a:p>
+        </p:txBody>
+      </p:sp>
+      <p:sp>
+        <p:nvSpPr>
+          <p:cNvPr id="105" name="ZoneTexte 104"/>
+          <p:cNvSpPr txBox="1"/>
+          <p:nvPr/>
+        </p:nvSpPr>
+        <p:spPr>
+          <a:xfrm>
+            <a:off x="5902991" y="2008140"/>
+            <a:ext cx="842063" cy="983210"/>
+          </a:xfrm>
+          <a:prstGeom prst="rect">
+            <a:avLst/>
+          </a:prstGeom>
+          <a:noFill/>
+          <a:ln>
+            <a:solidFill>
+              <a:schemeClr val="tx1"/>
+            </a:solidFill>
+          </a:ln>
+        </p:spPr>
+        <p:txBody>
+          <a:bodyPr wrap="square" lIns="36000" tIns="36000" rIns="36000" bIns="36000" rtlCol="0">
+            <a:noAutofit/>
+          </a:bodyPr>
+          <a:lstStyle/>
+          <a:p>
+            <a:pPr algn="ctr"/>
+            <a:r>
+              <a:rPr lang="fr-FR" sz="800" b="1" smtClean="0"/>
+              <a:t>Frontale (1)</a:t>
+            </a:r>
+            <a:endParaRPr lang="fr-FR" sz="800" b="1" dirty="0" smtClean="0"/>
+          </a:p>
+          <a:p>
+            <a:pPr algn="ctr"/>
+            <a:endParaRPr lang="fr-FR" sz="800" b="1" dirty="0" smtClean="0"/>
+          </a:p>
+          <a:p>
+            <a:r>
+              <a:rPr lang="fr-FR" sz="800" b="1" smtClean="0"/>
+              <a:t>Frontale</a:t>
+            </a:r>
+          </a:p>
+          <a:p>
+            <a:r>
+              <a:rPr lang="fr-FR" sz="800" dirty="0" smtClean="0"/>
+              <a:t>IP</a:t>
+            </a:r>
+          </a:p>
+          <a:p>
+            <a:r>
+              <a:rPr lang="fr-FR" sz="800" smtClean="0"/>
+              <a:t>Famille</a:t>
+            </a:r>
+          </a:p>
+          <a:p>
+            <a:r>
+              <a:rPr lang="fr-FR" sz="800" smtClean="0"/>
+              <a:t>InternalPort</a:t>
+            </a:r>
+          </a:p>
+          <a:p>
+            <a:r>
+              <a:rPr lang="fr-FR" sz="800" smtClean="0"/>
+              <a:t>ExternalPort</a:t>
+            </a:r>
+          </a:p>
+          <a:p>
+            <a:endParaRPr lang="fr-FR" sz="800" dirty="0" smtClean="0"/>
+          </a:p>
+          <a:p>
+            <a:pPr algn="ctr"/>
+            <a:endParaRPr lang="fr-FR" sz="800" b="1" dirty="0"/>
+          </a:p>
+        </p:txBody>
+      </p:sp>
+      <p:sp>
+        <p:nvSpPr>
+          <p:cNvPr id="112" name="ZoneTexte 111"/>
+          <p:cNvSpPr txBox="1"/>
+          <p:nvPr/>
+        </p:nvSpPr>
+        <p:spPr>
+          <a:xfrm>
+            <a:off x="8207783" y="364236"/>
+            <a:ext cx="842063" cy="983210"/>
+          </a:xfrm>
+          <a:prstGeom prst="rect">
+            <a:avLst/>
+          </a:prstGeom>
+          <a:noFill/>
+          <a:ln>
+            <a:solidFill>
+              <a:schemeClr val="tx1"/>
+            </a:solidFill>
+          </a:ln>
+        </p:spPr>
+        <p:txBody>
+          <a:bodyPr wrap="square" lIns="36000" tIns="36000" rIns="36000" bIns="36000" rtlCol="0">
+            <a:noAutofit/>
+          </a:bodyPr>
+          <a:lstStyle/>
+          <a:p>
+            <a:pPr algn="ctr"/>
+            <a:r>
+              <a:rPr lang="fr-FR" sz="800" b="1" smtClean="0"/>
+              <a:t>Frontales</a:t>
+            </a:r>
+            <a:endParaRPr lang="fr-FR" sz="800" b="1" dirty="0" smtClean="0"/>
+          </a:p>
+          <a:p>
+            <a:pPr algn="ctr"/>
+            <a:endParaRPr lang="fr-FR" sz="800" b="1" dirty="0" smtClean="0"/>
+          </a:p>
+          <a:p>
+            <a:r>
+              <a:rPr lang="fr-FR" sz="800" b="1" smtClean="0"/>
+              <a:t>Frontale</a:t>
+            </a:r>
+          </a:p>
+          <a:p>
+            <a:r>
+              <a:rPr lang="fr-FR" sz="800" dirty="0" smtClean="0"/>
+              <a:t>IP</a:t>
+            </a:r>
+          </a:p>
+          <a:p>
+            <a:r>
+              <a:rPr lang="fr-FR" sz="800" smtClean="0"/>
+              <a:t>Famille</a:t>
+            </a:r>
+          </a:p>
+          <a:p>
+            <a:r>
+              <a:rPr lang="fr-FR" sz="800" smtClean="0"/>
+              <a:t>InternalPort</a:t>
+            </a:r>
+          </a:p>
+          <a:p>
+            <a:r>
+              <a:rPr lang="fr-FR" sz="800" smtClean="0"/>
+              <a:t>ExternalPort</a:t>
+            </a:r>
+          </a:p>
+          <a:p>
+            <a:endParaRPr lang="fr-FR" sz="800" dirty="0" smtClean="0"/>
+          </a:p>
+          <a:p>
+            <a:pPr algn="ctr"/>
+            <a:endParaRPr lang="fr-FR" sz="800" b="1" dirty="0"/>
+          </a:p>
+        </p:txBody>
+      </p:sp>
+      <p:sp>
+        <p:nvSpPr>
+          <p:cNvPr id="80" name="ZoneTexte 79"/>
+          <p:cNvSpPr txBox="1"/>
+          <p:nvPr/>
+        </p:nvSpPr>
+        <p:spPr>
+          <a:xfrm>
+            <a:off x="5907703" y="5170016"/>
+            <a:ext cx="875997" cy="563642"/>
+          </a:xfrm>
+          <a:prstGeom prst="rect">
+            <a:avLst/>
+          </a:prstGeom>
+          <a:noFill/>
+          <a:ln>
+            <a:solidFill>
+              <a:schemeClr val="tx1"/>
+            </a:solidFill>
+          </a:ln>
+        </p:spPr>
+        <p:txBody>
+          <a:bodyPr wrap="square" lIns="36000" tIns="36000" rIns="36000" bIns="36000" rtlCol="0">
+            <a:noAutofit/>
+          </a:bodyPr>
+          <a:lstStyle/>
+          <a:p>
+            <a:pPr algn="ctr"/>
+            <a:r>
+              <a:rPr lang="fr-FR" sz="800" smtClean="0"/>
+              <a:t>Server</a:t>
+            </a:r>
+            <a:endParaRPr lang="fr-FR" sz="800" dirty="0" smtClean="0"/>
+          </a:p>
+          <a:p>
+            <a:pPr algn="ctr"/>
+            <a:endParaRPr lang="fr-FR" sz="800" smtClean="0"/>
+          </a:p>
+          <a:p>
+            <a:r>
+              <a:rPr lang="fr-FR" sz="800" smtClean="0"/>
+              <a:t>IP</a:t>
+            </a:r>
+          </a:p>
+          <a:p>
+            <a:r>
+              <a:rPr lang="fr-FR" sz="800" smtClean="0"/>
+              <a:t>Port</a:t>
+            </a:r>
+          </a:p>
+          <a:p>
+            <a:pPr algn="ctr"/>
+            <a:endParaRPr lang="fr-FR" sz="800" dirty="0"/>
+          </a:p>
+        </p:txBody>
+      </p:sp>
     </p:spTree>
     <p:extLst>
       <p:ext uri="{BB962C8B-B14F-4D97-AF65-F5344CB8AC3E}">
-        <p14:creationId xmlns:p14="http://schemas.microsoft.com/office/powerpoint/2010/main" val="1571054170"/>
+        <p14:creationId xmlns:p14="http://schemas.microsoft.com/office/powerpoint/2010/main" val="1376847778"/>
       </p:ext>
     </p:extLst>
   </p:cSld>
   <p:clrMapOvr>
     <a:masterClrMapping/>
   </p:clrMapOvr>
+  <p:timing>
+    <p:tnLst>
+      <p:par>
+        <p:cTn xmlns:p14="http://schemas.microsoft.com/office/powerpoint/2010/main" id="1" dur="indefinite" restart="never" nodeType="tmRoot"/>
+      </p:par>
+    </p:tnLst>
+  </p:timing>
 </p:sld>
 </file>
 

</xml_diff>